<commit_message>
Homogenisation of Patterns presentation
Homogenisation of Patterns presentation
</commit_message>
<xml_diff>
--- a/CSharpProgramming/Presentations/OOProgPartIII/AbstractFactory.pptx
+++ b/CSharpProgramming/Presentations/OOProgPartIII/AbstractFactory.pptx
@@ -273,7 +273,7 @@
           <a:p>
             <a:fld id="{E15B7D8E-2A20-4C0E-991C-872DBB7459A8}" type="datetimeFigureOut">
               <a:rPr lang="da-DK" smtClean="0"/>
-              <a:t>05-04-2018</a:t>
+              <a:t>16-04-2018</a:t>
             </a:fld>
             <a:endParaRPr lang="da-DK"/>
           </a:p>
@@ -443,7 +443,7 @@
           <a:p>
             <a:fld id="{E15B7D8E-2A20-4C0E-991C-872DBB7459A8}" type="datetimeFigureOut">
               <a:rPr lang="da-DK" smtClean="0"/>
-              <a:t>05-04-2018</a:t>
+              <a:t>16-04-2018</a:t>
             </a:fld>
             <a:endParaRPr lang="da-DK"/>
           </a:p>
@@ -623,7 +623,7 @@
           <a:p>
             <a:fld id="{E15B7D8E-2A20-4C0E-991C-872DBB7459A8}" type="datetimeFigureOut">
               <a:rPr lang="da-DK" smtClean="0"/>
-              <a:t>05-04-2018</a:t>
+              <a:t>16-04-2018</a:t>
             </a:fld>
             <a:endParaRPr lang="da-DK"/>
           </a:p>
@@ -793,7 +793,7 @@
           <a:p>
             <a:fld id="{E15B7D8E-2A20-4C0E-991C-872DBB7459A8}" type="datetimeFigureOut">
               <a:rPr lang="da-DK" smtClean="0"/>
-              <a:t>05-04-2018</a:t>
+              <a:t>16-04-2018</a:t>
             </a:fld>
             <a:endParaRPr lang="da-DK"/>
           </a:p>
@@ -1039,7 +1039,7 @@
           <a:p>
             <a:fld id="{E15B7D8E-2A20-4C0E-991C-872DBB7459A8}" type="datetimeFigureOut">
               <a:rPr lang="da-DK" smtClean="0"/>
-              <a:t>05-04-2018</a:t>
+              <a:t>16-04-2018</a:t>
             </a:fld>
             <a:endParaRPr lang="da-DK"/>
           </a:p>
@@ -1271,7 +1271,7 @@
           <a:p>
             <a:fld id="{E15B7D8E-2A20-4C0E-991C-872DBB7459A8}" type="datetimeFigureOut">
               <a:rPr lang="da-DK" smtClean="0"/>
-              <a:t>05-04-2018</a:t>
+              <a:t>16-04-2018</a:t>
             </a:fld>
             <a:endParaRPr lang="da-DK"/>
           </a:p>
@@ -1638,7 +1638,7 @@
           <a:p>
             <a:fld id="{E15B7D8E-2A20-4C0E-991C-872DBB7459A8}" type="datetimeFigureOut">
               <a:rPr lang="da-DK" smtClean="0"/>
-              <a:t>05-04-2018</a:t>
+              <a:t>16-04-2018</a:t>
             </a:fld>
             <a:endParaRPr lang="da-DK"/>
           </a:p>
@@ -1756,7 +1756,7 @@
           <a:p>
             <a:fld id="{E15B7D8E-2A20-4C0E-991C-872DBB7459A8}" type="datetimeFigureOut">
               <a:rPr lang="da-DK" smtClean="0"/>
-              <a:t>05-04-2018</a:t>
+              <a:t>16-04-2018</a:t>
             </a:fld>
             <a:endParaRPr lang="da-DK"/>
           </a:p>
@@ -1851,7 +1851,7 @@
           <a:p>
             <a:fld id="{E15B7D8E-2A20-4C0E-991C-872DBB7459A8}" type="datetimeFigureOut">
               <a:rPr lang="da-DK" smtClean="0"/>
-              <a:t>05-04-2018</a:t>
+              <a:t>16-04-2018</a:t>
             </a:fld>
             <a:endParaRPr lang="da-DK"/>
           </a:p>
@@ -2128,7 +2128,7 @@
           <a:p>
             <a:fld id="{E15B7D8E-2A20-4C0E-991C-872DBB7459A8}" type="datetimeFigureOut">
               <a:rPr lang="da-DK" smtClean="0"/>
-              <a:t>05-04-2018</a:t>
+              <a:t>16-04-2018</a:t>
             </a:fld>
             <a:endParaRPr lang="da-DK"/>
           </a:p>
@@ -2381,7 +2381,7 @@
           <a:p>
             <a:fld id="{E15B7D8E-2A20-4C0E-991C-872DBB7459A8}" type="datetimeFigureOut">
               <a:rPr lang="da-DK" smtClean="0"/>
-              <a:t>05-04-2018</a:t>
+              <a:t>16-04-2018</a:t>
             </a:fld>
             <a:endParaRPr lang="da-DK"/>
           </a:p>
@@ -2594,7 +2594,7 @@
           <a:p>
             <a:fld id="{E15B7D8E-2A20-4C0E-991C-872DBB7459A8}" type="datetimeFigureOut">
               <a:rPr lang="da-DK" smtClean="0"/>
-              <a:t>05-04-2018</a:t>
+              <a:t>16-04-2018</a:t>
             </a:fld>
             <a:endParaRPr lang="da-DK"/>
           </a:p>
@@ -4795,13 +4795,7 @@
               <a:rPr lang="da-DK" sz="1600" b="1" smtClean="0">
                 <a:latin typeface="Consolas" panose="020B0609020204030204" pitchFamily="49" charset="0"/>
               </a:rPr>
-              <a:t> </a:t>
-            </a:r>
-            <a:r>
-              <a:rPr lang="da-DK" sz="1600" b="1" smtClean="0">
-                <a:latin typeface="Consolas" panose="020B0609020204030204" pitchFamily="49" charset="0"/>
-              </a:rPr>
-              <a:t>PettingZooV70(</a:t>
+              <a:t> PettingZooV70(</a:t>
             </a:r>
             <a:r>
               <a:rPr lang="en-US" sz="1600" b="1" smtClean="0">
@@ -4818,13 +4812,7 @@
               <a:rPr lang="da-DK" sz="1600" b="1" smtClean="0">
                 <a:latin typeface="Consolas" panose="020B0609020204030204" pitchFamily="49" charset="0"/>
               </a:rPr>
-              <a:t> </a:t>
-            </a:r>
-            <a:r>
-              <a:rPr lang="da-DK" sz="1600" b="1" smtClean="0">
-                <a:latin typeface="Consolas" panose="020B0609020204030204" pitchFamily="49" charset="0"/>
-              </a:rPr>
-              <a:t>aChild, </a:t>
+              <a:t> aChild, </a:t>
             </a:r>
             <a:r>
               <a:rPr lang="da-DK" sz="1600" b="1" smtClean="0">
@@ -4858,13 +4846,7 @@
               <a:rPr lang="da-DK" sz="1600" b="1" smtClean="0">
                 <a:latin typeface="Consolas" panose="020B0609020204030204" pitchFamily="49" charset="0"/>
               </a:rPr>
-              <a:t> </a:t>
-            </a:r>
-            <a:r>
-              <a:rPr lang="da-DK" sz="1600" b="1" smtClean="0">
-                <a:latin typeface="Consolas" panose="020B0609020204030204" pitchFamily="49" charset="0"/>
-              </a:rPr>
-              <a:t>factoryFood)</a:t>
+              <a:t> factoryFood)</a:t>
             </a:r>
             <a:endParaRPr lang="da-DK" sz="1600" b="1">
               <a:latin typeface="Consolas" panose="020B0609020204030204" pitchFamily="49" charset="0"/>
@@ -5424,8 +5406,11 @@
           </a:prstGeom>
           <a:ln w="76200">
             <a:solidFill>
-              <a:schemeClr val="tx1"/>
+              <a:schemeClr val="bg1">
+                <a:lumMod val="50000"/>
+              </a:schemeClr>
             </a:solidFill>
+            <a:prstDash val="sysDot"/>
             <a:headEnd w="lg" len="lg"/>
             <a:tailEnd type="arrow" w="lg" len="lg"/>
           </a:ln>
@@ -5463,8 +5448,11 @@
           </a:prstGeom>
           <a:ln w="76200">
             <a:solidFill>
-              <a:schemeClr val="tx1"/>
+              <a:schemeClr val="bg1">
+                <a:lumMod val="50000"/>
+              </a:schemeClr>
             </a:solidFill>
+            <a:prstDash val="sysDot"/>
             <a:headEnd w="lg" len="lg"/>
             <a:tailEnd type="arrow" w="lg" len="lg"/>
           </a:ln>
@@ -5618,8 +5606,11 @@
           </a:prstGeom>
           <a:ln w="76200">
             <a:solidFill>
-              <a:schemeClr val="tx1"/>
+              <a:schemeClr val="bg1">
+                <a:lumMod val="50000"/>
+              </a:schemeClr>
             </a:solidFill>
+            <a:prstDash val="sysDot"/>
             <a:headEnd w="lg" len="lg"/>
             <a:tailEnd type="arrow" w="lg" len="lg"/>
           </a:ln>
@@ -5658,8 +5649,11 @@
           </a:prstGeom>
           <a:ln w="76200">
             <a:solidFill>
-              <a:schemeClr val="tx1"/>
+              <a:schemeClr val="bg1">
+                <a:lumMod val="50000"/>
+              </a:schemeClr>
             </a:solidFill>
+            <a:prstDash val="sysDot"/>
             <a:headEnd w="lg" len="lg"/>
             <a:tailEnd type="arrow" w="lg" len="lg"/>
           </a:ln>
@@ -5854,8 +5848,11 @@
           </a:prstGeom>
           <a:ln w="76200">
             <a:solidFill>
-              <a:schemeClr val="tx1"/>
+              <a:schemeClr val="bg1">
+                <a:lumMod val="50000"/>
+              </a:schemeClr>
             </a:solidFill>
+            <a:prstDash val="sysDot"/>
             <a:headEnd w="lg" len="lg"/>
             <a:tailEnd type="arrow" w="lg" len="lg"/>
           </a:ln>
@@ -5894,8 +5891,11 @@
           </a:prstGeom>
           <a:ln w="76200">
             <a:solidFill>
-              <a:schemeClr val="tx1"/>
+              <a:schemeClr val="bg1">
+                <a:lumMod val="50000"/>
+              </a:schemeClr>
             </a:solidFill>
+            <a:prstDash val="sysDot"/>
             <a:headEnd w="lg" len="lg"/>
             <a:tailEnd type="arrow" w="lg" len="lg"/>
           </a:ln>
@@ -5934,8 +5934,11 @@
           </a:prstGeom>
           <a:ln w="76200">
             <a:solidFill>
-              <a:schemeClr val="tx1"/>
+              <a:schemeClr val="bg1">
+                <a:lumMod val="50000"/>
+              </a:schemeClr>
             </a:solidFill>
+            <a:prstDash val="sysDot"/>
             <a:headEnd w="lg" len="lg"/>
             <a:tailEnd type="arrow" w="lg" len="lg"/>
           </a:ln>
@@ -7244,8 +7247,11 @@
           </a:prstGeom>
           <a:ln w="76200">
             <a:solidFill>
-              <a:schemeClr val="tx1"/>
+              <a:schemeClr val="bg1">
+                <a:lumMod val="50000"/>
+              </a:schemeClr>
             </a:solidFill>
+            <a:prstDash val="sysDot"/>
             <a:headEnd w="lg" len="lg"/>
             <a:tailEnd type="arrow" w="lg" len="lg"/>
           </a:ln>
@@ -7283,8 +7289,11 @@
           </a:prstGeom>
           <a:ln w="76200">
             <a:solidFill>
-              <a:schemeClr val="tx1"/>
+              <a:schemeClr val="bg1">
+                <a:lumMod val="50000"/>
+              </a:schemeClr>
             </a:solidFill>
+            <a:prstDash val="sysDot"/>
             <a:headEnd w="lg" len="lg"/>
             <a:tailEnd type="arrow" w="lg" len="lg"/>
           </a:ln>
@@ -7438,8 +7447,11 @@
           </a:prstGeom>
           <a:ln w="76200">
             <a:solidFill>
-              <a:schemeClr val="tx1"/>
+              <a:schemeClr val="bg1">
+                <a:lumMod val="50000"/>
+              </a:schemeClr>
             </a:solidFill>
+            <a:prstDash val="sysDot"/>
             <a:headEnd w="lg" len="lg"/>
             <a:tailEnd type="arrow" w="lg" len="lg"/>
           </a:ln>
@@ -7478,8 +7490,11 @@
           </a:prstGeom>
           <a:ln w="76200">
             <a:solidFill>
-              <a:schemeClr val="tx1"/>
+              <a:schemeClr val="bg1">
+                <a:lumMod val="50000"/>
+              </a:schemeClr>
             </a:solidFill>
+            <a:prstDash val="sysDot"/>
             <a:headEnd w="lg" len="lg"/>
             <a:tailEnd type="arrow" w="lg" len="lg"/>
           </a:ln>
@@ -7674,8 +7689,11 @@
           </a:prstGeom>
           <a:ln w="76200">
             <a:solidFill>
-              <a:schemeClr val="tx1"/>
+              <a:schemeClr val="bg1">
+                <a:lumMod val="50000"/>
+              </a:schemeClr>
             </a:solidFill>
+            <a:prstDash val="sysDot"/>
             <a:headEnd w="lg" len="lg"/>
             <a:tailEnd type="arrow" w="lg" len="lg"/>
           </a:ln>
@@ -7714,8 +7732,11 @@
           </a:prstGeom>
           <a:ln w="76200">
             <a:solidFill>
-              <a:schemeClr val="tx1"/>
+              <a:schemeClr val="bg1">
+                <a:lumMod val="50000"/>
+              </a:schemeClr>
             </a:solidFill>
+            <a:prstDash val="sysDot"/>
             <a:headEnd w="lg" len="lg"/>
             <a:tailEnd type="arrow" w="lg" len="lg"/>
           </a:ln>
@@ -7754,8 +7775,11 @@
           </a:prstGeom>
           <a:ln w="76200">
             <a:solidFill>
-              <a:schemeClr val="tx1"/>
+              <a:schemeClr val="bg1">
+                <a:lumMod val="50000"/>
+              </a:schemeClr>
             </a:solidFill>
+            <a:prstDash val="sysDot"/>
             <a:headEnd w="lg" len="lg"/>
             <a:tailEnd type="arrow" w="lg" len="lg"/>
           </a:ln>
@@ -7943,8 +7967,11 @@
           </a:prstGeom>
           <a:ln w="76200">
             <a:solidFill>
-              <a:schemeClr val="tx1"/>
+              <a:schemeClr val="bg1">
+                <a:lumMod val="50000"/>
+              </a:schemeClr>
             </a:solidFill>
+            <a:prstDash val="sysDot"/>
             <a:headEnd w="lg" len="lg"/>
             <a:tailEnd type="arrow" w="lg" len="lg"/>
           </a:ln>
@@ -7982,8 +8009,11 @@
           </a:prstGeom>
           <a:ln w="76200">
             <a:solidFill>
-              <a:schemeClr val="tx1"/>
+              <a:schemeClr val="bg1">
+                <a:lumMod val="50000"/>
+              </a:schemeClr>
             </a:solidFill>
+            <a:prstDash val="sysDot"/>
             <a:headEnd w="lg" len="lg"/>
             <a:tailEnd type="arrow" w="lg" len="lg"/>
           </a:ln>
@@ -8137,8 +8167,11 @@
           </a:prstGeom>
           <a:ln w="76200">
             <a:solidFill>
-              <a:schemeClr val="tx1"/>
+              <a:schemeClr val="bg1">
+                <a:lumMod val="50000"/>
+              </a:schemeClr>
             </a:solidFill>
+            <a:prstDash val="sysDot"/>
             <a:headEnd w="lg" len="lg"/>
             <a:tailEnd type="arrow" w="lg" len="lg"/>
           </a:ln>
@@ -8177,8 +8210,11 @@
           </a:prstGeom>
           <a:ln w="76200">
             <a:solidFill>
-              <a:schemeClr val="tx1"/>
+              <a:schemeClr val="bg1">
+                <a:lumMod val="50000"/>
+              </a:schemeClr>
             </a:solidFill>
+            <a:prstDash val="sysDot"/>
             <a:headEnd w="lg" len="lg"/>
             <a:tailEnd type="arrow" w="lg" len="lg"/>
           </a:ln>
@@ -8332,8 +8368,11 @@
           </a:prstGeom>
           <a:ln w="76200">
             <a:solidFill>
-              <a:schemeClr val="tx1"/>
+              <a:schemeClr val="bg1">
+                <a:lumMod val="50000"/>
+              </a:schemeClr>
             </a:solidFill>
+            <a:prstDash val="sysDot"/>
             <a:headEnd w="lg" len="lg"/>
             <a:tailEnd type="arrow" w="lg" len="lg"/>
           </a:ln>
@@ -8372,8 +8411,11 @@
           </a:prstGeom>
           <a:ln w="76200">
             <a:solidFill>
-              <a:schemeClr val="tx1"/>
+              <a:schemeClr val="bg1">
+                <a:lumMod val="50000"/>
+              </a:schemeClr>
             </a:solidFill>
+            <a:prstDash val="sysDot"/>
             <a:headEnd w="lg" len="lg"/>
             <a:tailEnd type="arrow" w="lg" len="lg"/>
           </a:ln>
@@ -8412,8 +8454,11 @@
           </a:prstGeom>
           <a:ln w="76200">
             <a:solidFill>
-              <a:schemeClr val="tx1"/>
+              <a:schemeClr val="bg1">
+                <a:lumMod val="50000"/>
+              </a:schemeClr>
             </a:solidFill>
+            <a:prstDash val="sysDot"/>
             <a:headEnd w="lg" len="lg"/>
             <a:tailEnd type="arrow" w="lg" len="lg"/>
           </a:ln>
@@ -8545,8 +8590,11 @@
           </a:prstGeom>
           <a:ln w="76200">
             <a:solidFill>
-              <a:schemeClr val="tx1"/>
+              <a:schemeClr val="bg1">
+                <a:lumMod val="50000"/>
+              </a:schemeClr>
             </a:solidFill>
+            <a:prstDash val="sysDot"/>
             <a:headEnd w="lg" len="lg"/>
             <a:tailEnd type="arrow" w="lg" len="lg"/>
           </a:ln>
@@ -8776,8 +8824,11 @@
           </a:prstGeom>
           <a:ln w="76200">
             <a:solidFill>
-              <a:schemeClr val="tx1"/>
+              <a:schemeClr val="bg1">
+                <a:lumMod val="50000"/>
+              </a:schemeClr>
             </a:solidFill>
+            <a:prstDash val="sysDot"/>
             <a:headEnd w="lg" len="lg"/>
             <a:tailEnd type="arrow" w="lg" len="lg"/>
           </a:ln>
@@ -8974,13 +9025,7 @@
               <a:rPr lang="da-DK" sz="2400" b="1" smtClean="0">
                 <a:latin typeface="Consolas" panose="020B0609020204030204" pitchFamily="49" charset="0"/>
               </a:rPr>
-              <a:t> </a:t>
-            </a:r>
-            <a:r>
-              <a:rPr lang="da-DK" sz="2400" b="1" smtClean="0">
-                <a:latin typeface="Consolas" panose="020B0609020204030204" pitchFamily="49" charset="0"/>
-              </a:rPr>
-              <a:t>CreateFood(</a:t>
+              <a:t> CreateFood(</a:t>
             </a:r>
             <a:r>
               <a:rPr lang="da-DK" sz="2400" b="1">
@@ -9017,32 +9062,23 @@
               <a:rPr lang="da-DK" sz="2400" b="1" smtClean="0">
                 <a:latin typeface="Consolas" panose="020B0609020204030204" pitchFamily="49" charset="0"/>
               </a:rPr>
-              <a:t> </a:t>
+              <a:t> CreateAnimal(</a:t>
+            </a:r>
+            <a:r>
+              <a:rPr lang="da-DK" sz="2400" b="1">
+                <a:solidFill>
+                  <a:srgbClr val="0070C0"/>
+                </a:solidFill>
+                <a:latin typeface="Consolas" panose="020B0609020204030204" pitchFamily="49" charset="0"/>
+              </a:rPr>
+              <a:t>int </a:t>
             </a:r>
             <a:r>
               <a:rPr lang="da-DK" sz="2400" b="1" smtClean="0">
                 <a:latin typeface="Consolas" panose="020B0609020204030204" pitchFamily="49" charset="0"/>
               </a:rPr>
-              <a:t>CreateAnimal(</a:t>
-            </a:r>
-            <a:r>
-              <a:rPr lang="da-DK" sz="2400" b="1">
-                <a:solidFill>
-                  <a:srgbClr val="0070C0"/>
-                </a:solidFill>
-                <a:latin typeface="Consolas" panose="020B0609020204030204" pitchFamily="49" charset="0"/>
-              </a:rPr>
-              <a:t>int </a:t>
-            </a:r>
-            <a:r>
-              <a:rPr lang="da-DK" sz="2400" b="1" smtClean="0">
-                <a:latin typeface="Consolas" panose="020B0609020204030204" pitchFamily="49" charset="0"/>
-              </a:rPr>
               <a:t>age);</a:t>
             </a:r>
-            <a:endParaRPr lang="da-DK" sz="2400" b="1" smtClean="0">
-              <a:latin typeface="Consolas" panose="020B0609020204030204" pitchFamily="49" charset="0"/>
-            </a:endParaRPr>
           </a:p>
           <a:p>
             <a:r>
@@ -9447,13 +9483,7 @@
               <a:rPr lang="da-DK" sz="1600" b="1" smtClean="0">
                 <a:latin typeface="Consolas" panose="020B0609020204030204" pitchFamily="49" charset="0"/>
               </a:rPr>
-              <a:t>_afCute</a:t>
-            </a:r>
-            <a:r>
-              <a:rPr lang="da-DK" sz="1600" b="1" smtClean="0">
-                <a:latin typeface="Consolas" panose="020B0609020204030204" pitchFamily="49" charset="0"/>
-              </a:rPr>
-              <a:t>;</a:t>
+              <a:t>_afCute;</a:t>
             </a:r>
             <a:endParaRPr lang="da-DK" sz="1600" b="1">
               <a:latin typeface="Consolas" panose="020B0609020204030204" pitchFamily="49" charset="0"/>
@@ -9664,6 +9694,52 @@
               </a:rPr>
               <a:t> money) </a:t>
             </a:r>
+          </a:p>
+          <a:p>
+            <a:r>
+              <a:rPr lang="da-DK" sz="1600" b="1">
+                <a:latin typeface="Consolas" panose="020B0609020204030204" pitchFamily="49" charset="0"/>
+              </a:rPr>
+              <a:t> </a:t>
+            </a:r>
+            <a:r>
+              <a:rPr lang="da-DK" sz="1600" b="1" smtClean="0">
+                <a:latin typeface="Consolas" panose="020B0609020204030204" pitchFamily="49" charset="0"/>
+              </a:rPr>
+              <a:t>  { </a:t>
+            </a:r>
+          </a:p>
+          <a:p>
+            <a:r>
+              <a:rPr lang="da-DK" sz="1600" b="1">
+                <a:solidFill>
+                  <a:srgbClr val="0070C0"/>
+                </a:solidFill>
+                <a:latin typeface="Consolas" panose="020B0609020204030204" pitchFamily="49" charset="0"/>
+              </a:rPr>
+              <a:t> </a:t>
+            </a:r>
+            <a:r>
+              <a:rPr lang="da-DK" sz="1600" b="1" smtClean="0">
+                <a:solidFill>
+                  <a:srgbClr val="0070C0"/>
+                </a:solidFill>
+                <a:latin typeface="Consolas" panose="020B0609020204030204" pitchFamily="49" charset="0"/>
+              </a:rPr>
+              <a:t>     return</a:t>
+            </a:r>
+            <a:r>
+              <a:rPr lang="da-DK" sz="1600" b="1" smtClean="0">
+                <a:latin typeface="Consolas" panose="020B0609020204030204" pitchFamily="49" charset="0"/>
+              </a:rPr>
+              <a:t> _</a:t>
+            </a:r>
+            <a:r>
+              <a:rPr lang="da-DK" sz="1600" b="1">
+                <a:latin typeface="Consolas" panose="020B0609020204030204" pitchFamily="49" charset="0"/>
+              </a:rPr>
+              <a:t>ffCute.CreateFood(money);</a:t>
+            </a:r>
             <a:endParaRPr lang="da-DK" sz="1600" b="1" smtClean="0">
               <a:latin typeface="Consolas" panose="020B0609020204030204" pitchFamily="49" charset="0"/>
             </a:endParaRPr>
@@ -9679,55 +9755,6 @@
               <a:rPr lang="da-DK" sz="1600" b="1" smtClean="0">
                 <a:latin typeface="Consolas" panose="020B0609020204030204" pitchFamily="49" charset="0"/>
               </a:rPr>
-              <a:t>  { </a:t>
-            </a:r>
-          </a:p>
-          <a:p>
-            <a:r>
-              <a:rPr lang="da-DK" sz="1600" b="1">
-                <a:solidFill>
-                  <a:srgbClr val="0070C0"/>
-                </a:solidFill>
-                <a:latin typeface="Consolas" panose="020B0609020204030204" pitchFamily="49" charset="0"/>
-              </a:rPr>
-              <a:t> </a:t>
-            </a:r>
-            <a:r>
-              <a:rPr lang="da-DK" sz="1600" b="1" smtClean="0">
-                <a:solidFill>
-                  <a:srgbClr val="0070C0"/>
-                </a:solidFill>
-                <a:latin typeface="Consolas" panose="020B0609020204030204" pitchFamily="49" charset="0"/>
-              </a:rPr>
-              <a:t>     return</a:t>
-            </a:r>
-            <a:r>
-              <a:rPr lang="da-DK" sz="1600" b="1" smtClean="0">
-                <a:latin typeface="Consolas" panose="020B0609020204030204" pitchFamily="49" charset="0"/>
-              </a:rPr>
-              <a:t> _</a:t>
-            </a:r>
-            <a:r>
-              <a:rPr lang="da-DK" sz="1600" b="1">
-                <a:latin typeface="Consolas" panose="020B0609020204030204" pitchFamily="49" charset="0"/>
-              </a:rPr>
-              <a:t>ffCute.CreateFood(money);</a:t>
-            </a:r>
-            <a:endParaRPr lang="da-DK" sz="1600" b="1" smtClean="0">
-              <a:latin typeface="Consolas" panose="020B0609020204030204" pitchFamily="49" charset="0"/>
-            </a:endParaRPr>
-          </a:p>
-          <a:p>
-            <a:r>
-              <a:rPr lang="da-DK" sz="1600" b="1">
-                <a:latin typeface="Consolas" panose="020B0609020204030204" pitchFamily="49" charset="0"/>
-              </a:rPr>
-              <a:t> </a:t>
-            </a:r>
-            <a:r>
-              <a:rPr lang="da-DK" sz="1600" b="1" smtClean="0">
-                <a:latin typeface="Consolas" panose="020B0609020204030204" pitchFamily="49" charset="0"/>
-              </a:rPr>
               <a:t>  }</a:t>
             </a:r>
           </a:p>
@@ -9839,9 +9866,6 @@
               </a:rPr>
               <a:t>afCute.CreateAnimal(age);</a:t>
             </a:r>
-            <a:endParaRPr lang="da-DK" sz="1600" b="1">
-              <a:latin typeface="Consolas" panose="020B0609020204030204" pitchFamily="49" charset="0"/>
-            </a:endParaRPr>
           </a:p>
           <a:p>
             <a:r>
@@ -10039,13 +10063,317 @@
               <a:rPr lang="da-DK" sz="1600" b="1" smtClean="0">
                 <a:latin typeface="Consolas" panose="020B0609020204030204" pitchFamily="49" charset="0"/>
               </a:rPr>
+              <a:t>_ffExotic;</a:t>
+            </a:r>
+          </a:p>
+          <a:p>
+            <a:r>
+              <a:rPr lang="da-DK" sz="1600" b="1">
+                <a:latin typeface="Consolas" panose="020B0609020204030204" pitchFamily="49" charset="0"/>
+              </a:rPr>
+              <a:t> </a:t>
+            </a:r>
+            <a:r>
+              <a:rPr lang="da-DK" sz="1600" b="1" smtClean="0">
+                <a:latin typeface="Consolas" panose="020B0609020204030204" pitchFamily="49" charset="0"/>
+              </a:rPr>
+              <a:t>  </a:t>
+            </a:r>
+            <a:r>
+              <a:rPr lang="da-DK" sz="1600" b="1" smtClean="0">
+                <a:solidFill>
+                  <a:srgbClr val="0070C0"/>
+                </a:solidFill>
+                <a:latin typeface="Consolas" panose="020B0609020204030204" pitchFamily="49" charset="0"/>
+              </a:rPr>
+              <a:t>private</a:t>
+            </a:r>
+            <a:r>
+              <a:rPr lang="da-DK" sz="1600" b="1" smtClean="0">
+                <a:latin typeface="Consolas" panose="020B0609020204030204" pitchFamily="49" charset="0"/>
+              </a:rPr>
+              <a:t> </a:t>
+            </a:r>
+            <a:r>
+              <a:rPr lang="da-DK" sz="1600" b="1">
+                <a:solidFill>
+                  <a:schemeClr val="accent6">
+                    <a:lumMod val="75000"/>
+                  </a:schemeClr>
+                </a:solidFill>
+                <a:latin typeface="Consolas" panose="020B0609020204030204" pitchFamily="49" charset="0"/>
+              </a:rPr>
+              <a:t>AnimalFactoryExotic </a:t>
+            </a:r>
+            <a:r>
+              <a:rPr lang="da-DK" sz="1600" b="1" smtClean="0">
+                <a:latin typeface="Consolas" panose="020B0609020204030204" pitchFamily="49" charset="0"/>
+              </a:rPr>
               <a:t>_</a:t>
             </a:r>
             <a:r>
+              <a:rPr lang="da-DK" sz="1600" b="1">
+                <a:latin typeface="Consolas" panose="020B0609020204030204" pitchFamily="49" charset="0"/>
+              </a:rPr>
+              <a:t>afExotic;</a:t>
+            </a:r>
+          </a:p>
+          <a:p>
+            <a:endParaRPr lang="da-DK" sz="1600" smtClean="0"/>
+          </a:p>
+          <a:p>
+            <a:r>
               <a:rPr lang="da-DK" sz="1600" b="1" smtClean="0">
                 <a:latin typeface="Consolas" panose="020B0609020204030204" pitchFamily="49" charset="0"/>
               </a:rPr>
-              <a:t>ffExotic;</a:t>
+              <a:t>   </a:t>
+            </a:r>
+            <a:r>
+              <a:rPr lang="da-DK" sz="1600" b="1">
+                <a:solidFill>
+                  <a:srgbClr val="0070C0"/>
+                </a:solidFill>
+                <a:latin typeface="Consolas" panose="020B0609020204030204" pitchFamily="49" charset="0"/>
+              </a:rPr>
+              <a:t>public</a:t>
+            </a:r>
+            <a:r>
+              <a:rPr lang="da-DK" sz="1600" b="1" smtClean="0">
+                <a:latin typeface="Consolas" panose="020B0609020204030204" pitchFamily="49" charset="0"/>
+              </a:rPr>
+              <a:t> </a:t>
+            </a:r>
+            <a:r>
+              <a:rPr lang="da-DK" sz="1600" b="1">
+                <a:latin typeface="Consolas" panose="020B0609020204030204" pitchFamily="49" charset="0"/>
+              </a:rPr>
+              <a:t>PettingZooElementsFactoryCute()</a:t>
+            </a:r>
+          </a:p>
+          <a:p>
+            <a:r>
+              <a:rPr lang="da-DK" sz="1600" b="1">
+                <a:latin typeface="Consolas" panose="020B0609020204030204" pitchFamily="49" charset="0"/>
+              </a:rPr>
+              <a:t>   </a:t>
+            </a:r>
+            <a:r>
+              <a:rPr lang="da-DK" sz="1600" b="1" smtClean="0">
+                <a:latin typeface="Consolas" panose="020B0609020204030204" pitchFamily="49" charset="0"/>
+              </a:rPr>
+              <a:t>{</a:t>
+            </a:r>
+            <a:endParaRPr lang="da-DK" sz="1600" b="1">
+              <a:latin typeface="Consolas" panose="020B0609020204030204" pitchFamily="49" charset="0"/>
+            </a:endParaRPr>
+          </a:p>
+          <a:p>
+            <a:r>
+              <a:rPr lang="da-DK" sz="1600" b="1" smtClean="0">
+                <a:latin typeface="Consolas" panose="020B0609020204030204" pitchFamily="49" charset="0"/>
+              </a:rPr>
+              <a:t>      _</a:t>
+            </a:r>
+            <a:r>
+              <a:rPr lang="da-DK" sz="1600" b="1">
+                <a:latin typeface="Consolas" panose="020B0609020204030204" pitchFamily="49" charset="0"/>
+              </a:rPr>
+              <a:t>ffExotic = </a:t>
+            </a:r>
+            <a:r>
+              <a:rPr lang="da-DK" sz="1600" b="1">
+                <a:solidFill>
+                  <a:srgbClr val="0070C0"/>
+                </a:solidFill>
+                <a:latin typeface="Consolas" panose="020B0609020204030204" pitchFamily="49" charset="0"/>
+              </a:rPr>
+              <a:t>new</a:t>
+            </a:r>
+            <a:r>
+              <a:rPr lang="da-DK" sz="1600" b="1">
+                <a:latin typeface="Consolas" panose="020B0609020204030204" pitchFamily="49" charset="0"/>
+              </a:rPr>
+              <a:t> </a:t>
+            </a:r>
+            <a:r>
+              <a:rPr lang="da-DK" sz="1600" b="1" smtClean="0">
+                <a:solidFill>
+                  <a:schemeClr val="accent6">
+                    <a:lumMod val="75000"/>
+                  </a:schemeClr>
+                </a:solidFill>
+                <a:latin typeface="Consolas" panose="020B0609020204030204" pitchFamily="49" charset="0"/>
+              </a:rPr>
+              <a:t>FoodFactoryExotic</a:t>
+            </a:r>
+            <a:r>
+              <a:rPr lang="da-DK" sz="1600" b="1" smtClean="0">
+                <a:latin typeface="Consolas" panose="020B0609020204030204" pitchFamily="49" charset="0"/>
+              </a:rPr>
+              <a:t>();</a:t>
+            </a:r>
+            <a:endParaRPr lang="da-DK" sz="1600" b="1">
+              <a:latin typeface="Consolas" panose="020B0609020204030204" pitchFamily="49" charset="0"/>
+            </a:endParaRPr>
+          </a:p>
+          <a:p>
+            <a:r>
+              <a:rPr lang="da-DK" sz="1600" b="1" smtClean="0">
+                <a:latin typeface="Consolas" panose="020B0609020204030204" pitchFamily="49" charset="0"/>
+              </a:rPr>
+              <a:t>      _</a:t>
+            </a:r>
+            <a:r>
+              <a:rPr lang="da-DK" sz="1600" b="1">
+                <a:latin typeface="Consolas" panose="020B0609020204030204" pitchFamily="49" charset="0"/>
+              </a:rPr>
+              <a:t>afExotic = </a:t>
+            </a:r>
+            <a:r>
+              <a:rPr lang="da-DK" sz="1600" b="1">
+                <a:solidFill>
+                  <a:srgbClr val="0070C0"/>
+                </a:solidFill>
+                <a:latin typeface="Consolas" panose="020B0609020204030204" pitchFamily="49" charset="0"/>
+              </a:rPr>
+              <a:t>new</a:t>
+            </a:r>
+            <a:r>
+              <a:rPr lang="da-DK" sz="1600" b="1">
+                <a:latin typeface="Consolas" panose="020B0609020204030204" pitchFamily="49" charset="0"/>
+              </a:rPr>
+              <a:t> </a:t>
+            </a:r>
+            <a:r>
+              <a:rPr lang="da-DK" sz="1600" b="1" smtClean="0">
+                <a:solidFill>
+                  <a:schemeClr val="accent6">
+                    <a:lumMod val="75000"/>
+                  </a:schemeClr>
+                </a:solidFill>
+                <a:latin typeface="Consolas" panose="020B0609020204030204" pitchFamily="49" charset="0"/>
+              </a:rPr>
+              <a:t>AnimalFactoryExotic</a:t>
+            </a:r>
+            <a:r>
+              <a:rPr lang="da-DK" sz="1600" b="1" smtClean="0">
+                <a:latin typeface="Consolas" panose="020B0609020204030204" pitchFamily="49" charset="0"/>
+              </a:rPr>
+              <a:t>();</a:t>
+            </a:r>
+            <a:endParaRPr lang="da-DK" sz="1600" b="1">
+              <a:latin typeface="Consolas" panose="020B0609020204030204" pitchFamily="49" charset="0"/>
+            </a:endParaRPr>
+          </a:p>
+          <a:p>
+            <a:r>
+              <a:rPr lang="da-DK" sz="1600" b="1" smtClean="0">
+                <a:latin typeface="Consolas" panose="020B0609020204030204" pitchFamily="49" charset="0"/>
+              </a:rPr>
+              <a:t>   }</a:t>
+            </a:r>
+            <a:endParaRPr lang="da-DK" sz="1600" b="1">
+              <a:latin typeface="Consolas" panose="020B0609020204030204" pitchFamily="49" charset="0"/>
+            </a:endParaRPr>
+          </a:p>
+          <a:p>
+            <a:endParaRPr lang="da-DK" sz="1600" b="1">
+              <a:latin typeface="Consolas" panose="020B0609020204030204" pitchFamily="49" charset="0"/>
+            </a:endParaRPr>
+          </a:p>
+          <a:p>
+            <a:r>
+              <a:rPr lang="da-DK" sz="1600" b="1" smtClean="0">
+                <a:solidFill>
+                  <a:srgbClr val="0070C0"/>
+                </a:solidFill>
+                <a:latin typeface="Consolas" panose="020B0609020204030204" pitchFamily="49" charset="0"/>
+              </a:rPr>
+              <a:t>   public</a:t>
+            </a:r>
+            <a:r>
+              <a:rPr lang="da-DK" sz="1600" b="1" smtClean="0">
+                <a:latin typeface="Consolas" panose="020B0609020204030204" pitchFamily="49" charset="0"/>
+              </a:rPr>
+              <a:t> </a:t>
+            </a:r>
+            <a:r>
+              <a:rPr lang="da-DK" sz="1600" b="1" smtClean="0">
+                <a:solidFill>
+                  <a:schemeClr val="accent6">
+                    <a:lumMod val="75000"/>
+                  </a:schemeClr>
+                </a:solidFill>
+                <a:latin typeface="Consolas" panose="020B0609020204030204" pitchFamily="49" charset="0"/>
+              </a:rPr>
+              <a:t>IFood </a:t>
+            </a:r>
+            <a:r>
+              <a:rPr lang="da-DK" sz="1600" b="1" smtClean="0">
+                <a:latin typeface="Consolas" panose="020B0609020204030204" pitchFamily="49" charset="0"/>
+              </a:rPr>
+              <a:t>CreateFood(</a:t>
+            </a:r>
+            <a:r>
+              <a:rPr lang="da-DK" sz="1600" b="1">
+                <a:solidFill>
+                  <a:srgbClr val="0070C0"/>
+                </a:solidFill>
+                <a:latin typeface="Consolas" panose="020B0609020204030204" pitchFamily="49" charset="0"/>
+              </a:rPr>
+              <a:t>int</a:t>
+            </a:r>
+            <a:r>
+              <a:rPr lang="da-DK" sz="1600" b="1" smtClean="0">
+                <a:latin typeface="Consolas" panose="020B0609020204030204" pitchFamily="49" charset="0"/>
+              </a:rPr>
+              <a:t> money) </a:t>
+            </a:r>
+          </a:p>
+          <a:p>
+            <a:r>
+              <a:rPr lang="da-DK" sz="1600" b="1">
+                <a:latin typeface="Consolas" panose="020B0609020204030204" pitchFamily="49" charset="0"/>
+              </a:rPr>
+              <a:t> </a:t>
+            </a:r>
+            <a:r>
+              <a:rPr lang="da-DK" sz="1600" b="1" smtClean="0">
+                <a:latin typeface="Consolas" panose="020B0609020204030204" pitchFamily="49" charset="0"/>
+              </a:rPr>
+              <a:t>  { </a:t>
+            </a:r>
+          </a:p>
+          <a:p>
+            <a:r>
+              <a:rPr lang="da-DK" sz="1600" b="1">
+                <a:solidFill>
+                  <a:srgbClr val="0070C0"/>
+                </a:solidFill>
+                <a:latin typeface="Consolas" panose="020B0609020204030204" pitchFamily="49" charset="0"/>
+              </a:rPr>
+              <a:t> </a:t>
+            </a:r>
+            <a:r>
+              <a:rPr lang="da-DK" sz="1600" b="1" smtClean="0">
+                <a:solidFill>
+                  <a:srgbClr val="0070C0"/>
+                </a:solidFill>
+                <a:latin typeface="Consolas" panose="020B0609020204030204" pitchFamily="49" charset="0"/>
+              </a:rPr>
+              <a:t>     return</a:t>
+            </a:r>
+            <a:r>
+              <a:rPr lang="da-DK" sz="1600" b="1" smtClean="0">
+                <a:latin typeface="Consolas" panose="020B0609020204030204" pitchFamily="49" charset="0"/>
+              </a:rPr>
+              <a:t> _ffExotic.CreateFood(money</a:t>
+            </a:r>
+            <a:r>
+              <a:rPr lang="da-DK" sz="1600" b="1">
+                <a:latin typeface="Consolas" panose="020B0609020204030204" pitchFamily="49" charset="0"/>
+              </a:rPr>
+              <a:t>);</a:t>
             </a:r>
             <a:endParaRPr lang="da-DK" sz="1600" b="1" smtClean="0">
               <a:latin typeface="Consolas" panose="020B0609020204030204" pitchFamily="49" charset="0"/>
@@ -10062,7 +10390,23 @@
               <a:rPr lang="da-DK" sz="1600" b="1" smtClean="0">
                 <a:latin typeface="Consolas" panose="020B0609020204030204" pitchFamily="49" charset="0"/>
               </a:rPr>
-              <a:t>  </a:t>
+              <a:t>  }</a:t>
+            </a:r>
+          </a:p>
+          <a:p>
+            <a:endParaRPr lang="da-DK" sz="1600" b="1">
+              <a:latin typeface="Consolas" panose="020B0609020204030204" pitchFamily="49" charset="0"/>
+            </a:endParaRPr>
+          </a:p>
+          <a:p>
+            <a:r>
+              <a:rPr lang="da-DK" sz="1600" b="1">
+                <a:solidFill>
+                  <a:srgbClr val="0070C0"/>
+                </a:solidFill>
+                <a:latin typeface="Consolas" panose="020B0609020204030204" pitchFamily="49" charset="0"/>
+              </a:rPr>
+              <a:t> </a:t>
             </a:r>
             <a:r>
               <a:rPr lang="da-DK" sz="1600" b="1" smtClean="0">
@@ -10071,7 +10415,7 @@
                 </a:solidFill>
                 <a:latin typeface="Consolas" panose="020B0609020204030204" pitchFamily="49" charset="0"/>
               </a:rPr>
-              <a:t>private</a:t>
+              <a:t>  public</a:t>
             </a:r>
             <a:r>
               <a:rPr lang="da-DK" sz="1600" b="1" smtClean="0">
@@ -10080,7 +10424,7 @@
               <a:t> </a:t>
             </a:r>
             <a:r>
-              <a:rPr lang="da-DK" sz="1600" b="1">
+              <a:rPr lang="da-DK" sz="1600" b="1" smtClean="0">
                 <a:solidFill>
                   <a:schemeClr val="accent6">
                     <a:lumMod val="75000"/>
@@ -10088,449 +10432,87 @@
                 </a:solidFill>
                 <a:latin typeface="Consolas" panose="020B0609020204030204" pitchFamily="49" charset="0"/>
               </a:rPr>
-              <a:t>AnimalFactoryExotic </a:t>
+              <a:t>IAnimal </a:t>
             </a:r>
             <a:r>
               <a:rPr lang="da-DK" sz="1600" b="1" smtClean="0">
                 <a:latin typeface="Consolas" panose="020B0609020204030204" pitchFamily="49" charset="0"/>
               </a:rPr>
-              <a:t>_</a:t>
+              <a:t>CreateAnimal(</a:t>
             </a:r>
             <a:r>
               <a:rPr lang="da-DK" sz="1600" b="1">
-                <a:latin typeface="Consolas" panose="020B0609020204030204" pitchFamily="49" charset="0"/>
-              </a:rPr>
-              <a:t>afExotic;</a:t>
+                <a:solidFill>
+                  <a:srgbClr val="0070C0"/>
+                </a:solidFill>
+                <a:latin typeface="Consolas" panose="020B0609020204030204" pitchFamily="49" charset="0"/>
+              </a:rPr>
+              <a:t>int</a:t>
+            </a:r>
+            <a:r>
+              <a:rPr lang="da-DK" sz="1600" b="1">
+                <a:latin typeface="Consolas" panose="020B0609020204030204" pitchFamily="49" charset="0"/>
+              </a:rPr>
+              <a:t> </a:t>
+            </a:r>
+            <a:r>
+              <a:rPr lang="da-DK" sz="1600" b="1" smtClean="0">
+                <a:latin typeface="Consolas" panose="020B0609020204030204" pitchFamily="49" charset="0"/>
+              </a:rPr>
+              <a:t>age) </a:t>
             </a:r>
             <a:endParaRPr lang="da-DK" sz="1600" b="1">
               <a:latin typeface="Consolas" panose="020B0609020204030204" pitchFamily="49" charset="0"/>
             </a:endParaRPr>
           </a:p>
           <a:p>
-            <a:endParaRPr lang="da-DK" sz="1600" smtClean="0"/>
-          </a:p>
-          <a:p>
+            <a:r>
+              <a:rPr lang="da-DK" sz="1600" b="1">
+                <a:latin typeface="Consolas" panose="020B0609020204030204" pitchFamily="49" charset="0"/>
+              </a:rPr>
+              <a:t>   { </a:t>
+            </a:r>
+          </a:p>
+          <a:p>
+            <a:r>
+              <a:rPr lang="da-DK" sz="1600" b="1">
+                <a:solidFill>
+                  <a:srgbClr val="0070C0"/>
+                </a:solidFill>
+                <a:latin typeface="Consolas" panose="020B0609020204030204" pitchFamily="49" charset="0"/>
+              </a:rPr>
+              <a:t>      return</a:t>
+            </a:r>
+            <a:r>
+              <a:rPr lang="da-DK" sz="1600" b="1">
+                <a:latin typeface="Consolas" panose="020B0609020204030204" pitchFamily="49" charset="0"/>
+              </a:rPr>
+              <a:t> </a:t>
+            </a:r>
             <a:r>
               <a:rPr lang="da-DK" sz="1600" b="1" smtClean="0">
                 <a:latin typeface="Consolas" panose="020B0609020204030204" pitchFamily="49" charset="0"/>
               </a:rPr>
-              <a:t>   </a:t>
+              <a:t>_af</a:t>
             </a:r>
             <a:r>
               <a:rPr lang="da-DK" sz="1600" b="1">
-                <a:solidFill>
-                  <a:srgbClr val="0070C0"/>
-                </a:solidFill>
-                <a:latin typeface="Consolas" panose="020B0609020204030204" pitchFamily="49" charset="0"/>
-              </a:rPr>
-              <a:t>public</a:t>
+                <a:latin typeface="Consolas" panose="020B0609020204030204" pitchFamily="49" charset="0"/>
+              </a:rPr>
+              <a:t>Exotic</a:t>
             </a:r>
             <a:r>
               <a:rPr lang="da-DK" sz="1600" b="1" smtClean="0">
                 <a:latin typeface="Consolas" panose="020B0609020204030204" pitchFamily="49" charset="0"/>
               </a:rPr>
-              <a:t> </a:t>
+              <a:t>.CreateAnimal(age</a:t>
             </a:r>
             <a:r>
               <a:rPr lang="da-DK" sz="1600" b="1">
                 <a:latin typeface="Consolas" panose="020B0609020204030204" pitchFamily="49" charset="0"/>
               </a:rPr>
-              <a:t>PettingZooElementsFactoryCute()</a:t>
-            </a:r>
-          </a:p>
-          <a:p>
-            <a:r>
-              <a:rPr lang="da-DK" sz="1600" b="1">
-                <a:latin typeface="Consolas" panose="020B0609020204030204" pitchFamily="49" charset="0"/>
-              </a:rPr>
-              <a:t>   </a:t>
-            </a:r>
-            <a:r>
-              <a:rPr lang="da-DK" sz="1600" b="1" smtClean="0">
-                <a:latin typeface="Consolas" panose="020B0609020204030204" pitchFamily="49" charset="0"/>
-              </a:rPr>
-              <a:t>{</a:t>
-            </a:r>
-            <a:endParaRPr lang="da-DK" sz="1600" b="1">
-              <a:latin typeface="Consolas" panose="020B0609020204030204" pitchFamily="49" charset="0"/>
-            </a:endParaRPr>
-          </a:p>
-          <a:p>
-            <a:r>
-              <a:rPr lang="da-DK" sz="1600" b="1" smtClean="0">
-                <a:latin typeface="Consolas" panose="020B0609020204030204" pitchFamily="49" charset="0"/>
-              </a:rPr>
-              <a:t>      _</a:t>
-            </a:r>
-            <a:r>
-              <a:rPr lang="da-DK" sz="1600" b="1">
-                <a:latin typeface="Consolas" panose="020B0609020204030204" pitchFamily="49" charset="0"/>
-              </a:rPr>
-              <a:t>ffExotic </a:t>
-            </a:r>
-            <a:r>
-              <a:rPr lang="da-DK" sz="1600" b="1">
-                <a:latin typeface="Consolas" panose="020B0609020204030204" pitchFamily="49" charset="0"/>
-              </a:rPr>
-              <a:t>= </a:t>
-            </a:r>
-            <a:r>
-              <a:rPr lang="da-DK" sz="1600" b="1">
-                <a:solidFill>
-                  <a:srgbClr val="0070C0"/>
-                </a:solidFill>
-                <a:latin typeface="Consolas" panose="020B0609020204030204" pitchFamily="49" charset="0"/>
-              </a:rPr>
-              <a:t>new</a:t>
-            </a:r>
-            <a:r>
-              <a:rPr lang="da-DK" sz="1600" b="1">
-                <a:latin typeface="Consolas" panose="020B0609020204030204" pitchFamily="49" charset="0"/>
-              </a:rPr>
-              <a:t> </a:t>
-            </a:r>
-            <a:r>
-              <a:rPr lang="da-DK" sz="1600" b="1" smtClean="0">
-                <a:solidFill>
-                  <a:schemeClr val="accent6">
-                    <a:lumMod val="75000"/>
-                  </a:schemeClr>
-                </a:solidFill>
-                <a:latin typeface="Consolas" panose="020B0609020204030204" pitchFamily="49" charset="0"/>
-              </a:rPr>
-              <a:t>FoodFactoryExotic</a:t>
-            </a:r>
-            <a:r>
-              <a:rPr lang="da-DK" sz="1600" b="1" smtClean="0">
-                <a:latin typeface="Consolas" panose="020B0609020204030204" pitchFamily="49" charset="0"/>
-              </a:rPr>
-              <a:t>();</a:t>
-            </a:r>
-            <a:endParaRPr lang="da-DK" sz="1600" b="1">
-              <a:latin typeface="Consolas" panose="020B0609020204030204" pitchFamily="49" charset="0"/>
-            </a:endParaRPr>
-          </a:p>
-          <a:p>
-            <a:r>
-              <a:rPr lang="da-DK" sz="1600" b="1" smtClean="0">
-                <a:latin typeface="Consolas" panose="020B0609020204030204" pitchFamily="49" charset="0"/>
-              </a:rPr>
-              <a:t>      _</a:t>
-            </a:r>
-            <a:r>
-              <a:rPr lang="da-DK" sz="1600" b="1">
-                <a:latin typeface="Consolas" panose="020B0609020204030204" pitchFamily="49" charset="0"/>
-              </a:rPr>
-              <a:t>afExotic </a:t>
-            </a:r>
-            <a:r>
-              <a:rPr lang="da-DK" sz="1600" b="1">
-                <a:latin typeface="Consolas" panose="020B0609020204030204" pitchFamily="49" charset="0"/>
-              </a:rPr>
-              <a:t>= </a:t>
-            </a:r>
-            <a:r>
-              <a:rPr lang="da-DK" sz="1600" b="1">
-                <a:solidFill>
-                  <a:srgbClr val="0070C0"/>
-                </a:solidFill>
-                <a:latin typeface="Consolas" panose="020B0609020204030204" pitchFamily="49" charset="0"/>
-              </a:rPr>
-              <a:t>new</a:t>
-            </a:r>
-            <a:r>
-              <a:rPr lang="da-DK" sz="1600" b="1">
-                <a:latin typeface="Consolas" panose="020B0609020204030204" pitchFamily="49" charset="0"/>
-              </a:rPr>
-              <a:t> </a:t>
-            </a:r>
-            <a:r>
-              <a:rPr lang="da-DK" sz="1600" b="1" smtClean="0">
-                <a:solidFill>
-                  <a:schemeClr val="accent6">
-                    <a:lumMod val="75000"/>
-                  </a:schemeClr>
-                </a:solidFill>
-                <a:latin typeface="Consolas" panose="020B0609020204030204" pitchFamily="49" charset="0"/>
-              </a:rPr>
-              <a:t>AnimalFactoryExotic</a:t>
-            </a:r>
-            <a:r>
-              <a:rPr lang="da-DK" sz="1600" b="1" smtClean="0">
-                <a:latin typeface="Consolas" panose="020B0609020204030204" pitchFamily="49" charset="0"/>
-              </a:rPr>
-              <a:t>();</a:t>
-            </a:r>
-            <a:endParaRPr lang="da-DK" sz="1600" b="1">
-              <a:latin typeface="Consolas" panose="020B0609020204030204" pitchFamily="49" charset="0"/>
-            </a:endParaRPr>
-          </a:p>
-          <a:p>
-            <a:r>
-              <a:rPr lang="da-DK" sz="1600" b="1" smtClean="0">
-                <a:latin typeface="Consolas" panose="020B0609020204030204" pitchFamily="49" charset="0"/>
-              </a:rPr>
-              <a:t>   }</a:t>
-            </a:r>
-            <a:endParaRPr lang="da-DK" sz="1600" b="1">
-              <a:latin typeface="Consolas" panose="020B0609020204030204" pitchFamily="49" charset="0"/>
-            </a:endParaRPr>
-          </a:p>
-          <a:p>
-            <a:endParaRPr lang="da-DK" sz="1600" b="1">
-              <a:latin typeface="Consolas" panose="020B0609020204030204" pitchFamily="49" charset="0"/>
-            </a:endParaRPr>
-          </a:p>
-          <a:p>
-            <a:r>
-              <a:rPr lang="da-DK" sz="1600" b="1" smtClean="0">
-                <a:solidFill>
-                  <a:srgbClr val="0070C0"/>
-                </a:solidFill>
-                <a:latin typeface="Consolas" panose="020B0609020204030204" pitchFamily="49" charset="0"/>
-              </a:rPr>
-              <a:t>   public</a:t>
-            </a:r>
-            <a:r>
-              <a:rPr lang="da-DK" sz="1600" b="1" smtClean="0">
-                <a:latin typeface="Consolas" panose="020B0609020204030204" pitchFamily="49" charset="0"/>
-              </a:rPr>
-              <a:t> </a:t>
-            </a:r>
-            <a:r>
-              <a:rPr lang="da-DK" sz="1600" b="1" smtClean="0">
-                <a:solidFill>
-                  <a:schemeClr val="accent6">
-                    <a:lumMod val="75000"/>
-                  </a:schemeClr>
-                </a:solidFill>
-                <a:latin typeface="Consolas" panose="020B0609020204030204" pitchFamily="49" charset="0"/>
-              </a:rPr>
-              <a:t>IFood </a:t>
-            </a:r>
-            <a:r>
-              <a:rPr lang="da-DK" sz="1600" b="1" smtClean="0">
-                <a:latin typeface="Consolas" panose="020B0609020204030204" pitchFamily="49" charset="0"/>
-              </a:rPr>
-              <a:t>CreateFood(</a:t>
-            </a:r>
-            <a:r>
-              <a:rPr lang="da-DK" sz="1600" b="1">
-                <a:solidFill>
-                  <a:srgbClr val="0070C0"/>
-                </a:solidFill>
-                <a:latin typeface="Consolas" panose="020B0609020204030204" pitchFamily="49" charset="0"/>
-              </a:rPr>
-              <a:t>int</a:t>
-            </a:r>
-            <a:r>
-              <a:rPr lang="da-DK" sz="1600" b="1" smtClean="0">
-                <a:latin typeface="Consolas" panose="020B0609020204030204" pitchFamily="49" charset="0"/>
-              </a:rPr>
-              <a:t> money) </a:t>
-            </a:r>
-            <a:endParaRPr lang="da-DK" sz="1600" b="1" smtClean="0">
-              <a:latin typeface="Consolas" panose="020B0609020204030204" pitchFamily="49" charset="0"/>
-            </a:endParaRPr>
-          </a:p>
-          <a:p>
-            <a:r>
-              <a:rPr lang="da-DK" sz="1600" b="1">
-                <a:latin typeface="Consolas" panose="020B0609020204030204" pitchFamily="49" charset="0"/>
-              </a:rPr>
-              <a:t> </a:t>
-            </a:r>
-            <a:r>
-              <a:rPr lang="da-DK" sz="1600" b="1" smtClean="0">
-                <a:latin typeface="Consolas" panose="020B0609020204030204" pitchFamily="49" charset="0"/>
-              </a:rPr>
-              <a:t>  { </a:t>
-            </a:r>
-          </a:p>
-          <a:p>
-            <a:r>
-              <a:rPr lang="da-DK" sz="1600" b="1">
-                <a:solidFill>
-                  <a:srgbClr val="0070C0"/>
-                </a:solidFill>
-                <a:latin typeface="Consolas" panose="020B0609020204030204" pitchFamily="49" charset="0"/>
-              </a:rPr>
-              <a:t> </a:t>
-            </a:r>
-            <a:r>
-              <a:rPr lang="da-DK" sz="1600" b="1" smtClean="0">
-                <a:solidFill>
-                  <a:srgbClr val="0070C0"/>
-                </a:solidFill>
-                <a:latin typeface="Consolas" panose="020B0609020204030204" pitchFamily="49" charset="0"/>
-              </a:rPr>
-              <a:t>     return</a:t>
-            </a:r>
-            <a:r>
-              <a:rPr lang="da-DK" sz="1600" b="1" smtClean="0">
-                <a:latin typeface="Consolas" panose="020B0609020204030204" pitchFamily="49" charset="0"/>
-              </a:rPr>
-              <a:t> _</a:t>
-            </a:r>
-            <a:r>
-              <a:rPr lang="da-DK" sz="1600" b="1" smtClean="0">
-                <a:latin typeface="Consolas" panose="020B0609020204030204" pitchFamily="49" charset="0"/>
-              </a:rPr>
-              <a:t>ffExotic.CreateFood(money</a:t>
-            </a:r>
-            <a:r>
-              <a:rPr lang="da-DK" sz="1600" b="1">
-                <a:latin typeface="Consolas" panose="020B0609020204030204" pitchFamily="49" charset="0"/>
-              </a:rPr>
               <a:t>);</a:t>
             </a:r>
-            <a:endParaRPr lang="da-DK" sz="1600" b="1" smtClean="0">
-              <a:latin typeface="Consolas" panose="020B0609020204030204" pitchFamily="49" charset="0"/>
-            </a:endParaRPr>
-          </a:p>
-          <a:p>
-            <a:r>
-              <a:rPr lang="da-DK" sz="1600" b="1">
-                <a:latin typeface="Consolas" panose="020B0609020204030204" pitchFamily="49" charset="0"/>
-              </a:rPr>
-              <a:t> </a:t>
-            </a:r>
-            <a:r>
-              <a:rPr lang="da-DK" sz="1600" b="1" smtClean="0">
-                <a:latin typeface="Consolas" panose="020B0609020204030204" pitchFamily="49" charset="0"/>
-              </a:rPr>
-              <a:t>  }</a:t>
-            </a:r>
-          </a:p>
-          <a:p>
-            <a:endParaRPr lang="da-DK" sz="1600" b="1">
-              <a:latin typeface="Consolas" panose="020B0609020204030204" pitchFamily="49" charset="0"/>
-            </a:endParaRPr>
-          </a:p>
-          <a:p>
-            <a:r>
-              <a:rPr lang="da-DK" sz="1600" b="1">
-                <a:solidFill>
-                  <a:srgbClr val="0070C0"/>
-                </a:solidFill>
-                <a:latin typeface="Consolas" panose="020B0609020204030204" pitchFamily="49" charset="0"/>
-              </a:rPr>
-              <a:t> </a:t>
-            </a:r>
-            <a:r>
-              <a:rPr lang="da-DK" sz="1600" b="1" smtClean="0">
-                <a:solidFill>
-                  <a:srgbClr val="0070C0"/>
-                </a:solidFill>
-                <a:latin typeface="Consolas" panose="020B0609020204030204" pitchFamily="49" charset="0"/>
-              </a:rPr>
-              <a:t>  public</a:t>
-            </a:r>
-            <a:r>
-              <a:rPr lang="da-DK" sz="1600" b="1" smtClean="0">
-                <a:latin typeface="Consolas" panose="020B0609020204030204" pitchFamily="49" charset="0"/>
-              </a:rPr>
-              <a:t> </a:t>
-            </a:r>
-            <a:r>
-              <a:rPr lang="da-DK" sz="1600" b="1" smtClean="0">
-                <a:solidFill>
-                  <a:schemeClr val="accent6">
-                    <a:lumMod val="75000"/>
-                  </a:schemeClr>
-                </a:solidFill>
-                <a:latin typeface="Consolas" panose="020B0609020204030204" pitchFamily="49" charset="0"/>
-              </a:rPr>
-              <a:t>IAnimal </a:t>
-            </a:r>
-            <a:r>
-              <a:rPr lang="da-DK" sz="1600" b="1" smtClean="0">
-                <a:latin typeface="Consolas" panose="020B0609020204030204" pitchFamily="49" charset="0"/>
-              </a:rPr>
-              <a:t>CreateAnimal(</a:t>
-            </a:r>
-            <a:r>
-              <a:rPr lang="da-DK" sz="1600" b="1">
-                <a:solidFill>
-                  <a:srgbClr val="0070C0"/>
-                </a:solidFill>
-                <a:latin typeface="Consolas" panose="020B0609020204030204" pitchFamily="49" charset="0"/>
-              </a:rPr>
-              <a:t>int</a:t>
-            </a:r>
-            <a:r>
-              <a:rPr lang="da-DK" sz="1600" b="1">
-                <a:latin typeface="Consolas" panose="020B0609020204030204" pitchFamily="49" charset="0"/>
-              </a:rPr>
-              <a:t> </a:t>
-            </a:r>
-            <a:r>
-              <a:rPr lang="da-DK" sz="1600" b="1" smtClean="0">
-                <a:latin typeface="Consolas" panose="020B0609020204030204" pitchFamily="49" charset="0"/>
-              </a:rPr>
-              <a:t>age) </a:t>
-            </a:r>
-            <a:endParaRPr lang="da-DK" sz="1600" b="1">
-              <a:latin typeface="Consolas" panose="020B0609020204030204" pitchFamily="49" charset="0"/>
-            </a:endParaRPr>
-          </a:p>
-          <a:p>
-            <a:r>
-              <a:rPr lang="da-DK" sz="1600" b="1">
-                <a:latin typeface="Consolas" panose="020B0609020204030204" pitchFamily="49" charset="0"/>
-              </a:rPr>
-              <a:t>   { </a:t>
-            </a:r>
-          </a:p>
-          <a:p>
-            <a:r>
-              <a:rPr lang="da-DK" sz="1600" b="1">
-                <a:solidFill>
-                  <a:srgbClr val="0070C0"/>
-                </a:solidFill>
-                <a:latin typeface="Consolas" panose="020B0609020204030204" pitchFamily="49" charset="0"/>
-              </a:rPr>
-              <a:t>      return</a:t>
-            </a:r>
-            <a:r>
-              <a:rPr lang="da-DK" sz="1600" b="1">
-                <a:latin typeface="Consolas" panose="020B0609020204030204" pitchFamily="49" charset="0"/>
-              </a:rPr>
-              <a:t> </a:t>
-            </a:r>
-            <a:r>
-              <a:rPr lang="da-DK" sz="1600" b="1" smtClean="0">
-                <a:latin typeface="Consolas" panose="020B0609020204030204" pitchFamily="49" charset="0"/>
-              </a:rPr>
-              <a:t>_</a:t>
-            </a:r>
-            <a:r>
-              <a:rPr lang="da-DK" sz="1600" b="1" smtClean="0">
-                <a:latin typeface="Consolas" panose="020B0609020204030204" pitchFamily="49" charset="0"/>
-              </a:rPr>
-              <a:t>af</a:t>
-            </a:r>
-            <a:r>
-              <a:rPr lang="da-DK" sz="1600" b="1">
-                <a:latin typeface="Consolas" panose="020B0609020204030204" pitchFamily="49" charset="0"/>
-              </a:rPr>
-              <a:t>Exotic</a:t>
-            </a:r>
-            <a:r>
-              <a:rPr lang="da-DK" sz="1600" b="1" smtClean="0">
-                <a:latin typeface="Consolas" panose="020B0609020204030204" pitchFamily="49" charset="0"/>
-              </a:rPr>
-              <a:t>.CreateAnimal(age</a:t>
-            </a:r>
-            <a:r>
-              <a:rPr lang="da-DK" sz="1600" b="1">
-                <a:latin typeface="Consolas" panose="020B0609020204030204" pitchFamily="49" charset="0"/>
-              </a:rPr>
-              <a:t>);</a:t>
-            </a:r>
-            <a:endParaRPr lang="da-DK" sz="1600" b="1">
-              <a:latin typeface="Consolas" panose="020B0609020204030204" pitchFamily="49" charset="0"/>
-            </a:endParaRPr>
           </a:p>
           <a:p>
             <a:r>
@@ -10759,9 +10741,6 @@
               </a:rPr>
               <a:t>;</a:t>
             </a:r>
-            <a:endParaRPr lang="en-US" sz="1600" b="1" smtClean="0">
-              <a:latin typeface="Consolas" panose="020B0609020204030204" pitchFamily="49" charset="0"/>
-            </a:endParaRPr>
           </a:p>
           <a:p>
             <a:r>
@@ -10794,13 +10773,7 @@
               <a:rPr lang="da-DK" sz="1600" b="1" smtClean="0">
                 <a:latin typeface="Consolas" panose="020B0609020204030204" pitchFamily="49" charset="0"/>
               </a:rPr>
-              <a:t>      TheFood = </a:t>
-            </a:r>
-            <a:r>
-              <a:rPr lang="da-DK" sz="1600" b="1" smtClean="0">
-                <a:latin typeface="Consolas" panose="020B0609020204030204" pitchFamily="49" charset="0"/>
-              </a:rPr>
-              <a:t>factory.CreateFood(aChild.MoneyLimit);</a:t>
+              <a:t>      TheFood = factory.CreateFood(aChild.MoneyLimit);</a:t>
             </a:r>
             <a:endParaRPr lang="en-US" sz="1600" b="1">
               <a:latin typeface="Consolas" panose="020B0609020204030204" pitchFamily="49" charset="0"/>
@@ -11286,8 +11259,11 @@
           </a:prstGeom>
           <a:ln w="76200">
             <a:solidFill>
-              <a:schemeClr val="tx1"/>
+              <a:schemeClr val="bg1">
+                <a:lumMod val="50000"/>
+              </a:schemeClr>
             </a:solidFill>
+            <a:prstDash val="sysDot"/>
             <a:headEnd w="lg" len="lg"/>
             <a:tailEnd type="arrow" w="lg" len="lg"/>
           </a:ln>
@@ -11325,8 +11301,11 @@
           </a:prstGeom>
           <a:ln w="76200">
             <a:solidFill>
-              <a:schemeClr val="tx1"/>
+              <a:schemeClr val="bg1">
+                <a:lumMod val="50000"/>
+              </a:schemeClr>
             </a:solidFill>
+            <a:prstDash val="sysDot"/>
             <a:headEnd w="lg" len="lg"/>
             <a:tailEnd type="arrow" w="lg" len="lg"/>
           </a:ln>
@@ -11491,8 +11470,11 @@
           </a:prstGeom>
           <a:ln w="76200">
             <a:solidFill>
-              <a:schemeClr val="tx1"/>
+              <a:schemeClr val="bg1">
+                <a:lumMod val="50000"/>
+              </a:schemeClr>
             </a:solidFill>
+            <a:prstDash val="sysDot"/>
             <a:headEnd w="lg" len="lg"/>
             <a:tailEnd type="arrow" w="lg" len="lg"/>
           </a:ln>
@@ -11528,8 +11510,11 @@
           </a:prstGeom>
           <a:ln w="76200">
             <a:solidFill>
-              <a:schemeClr val="tx1"/>
+              <a:schemeClr val="bg1">
+                <a:lumMod val="50000"/>
+              </a:schemeClr>
             </a:solidFill>
+            <a:prstDash val="sysDot"/>
             <a:headEnd w="lg" len="lg"/>
             <a:tailEnd type="arrow" w="lg" len="lg"/>
           </a:ln>
@@ -11661,8 +11646,11 @@
           </a:prstGeom>
           <a:ln w="76200">
             <a:solidFill>
-              <a:schemeClr val="tx1"/>
+              <a:schemeClr val="bg1">
+                <a:lumMod val="50000"/>
+              </a:schemeClr>
             </a:solidFill>
+            <a:prstDash val="sysDot"/>
             <a:headEnd w="lg" len="lg"/>
             <a:tailEnd type="arrow" w="lg" len="lg"/>
           </a:ln>
@@ -11701,8 +11689,11 @@
           </a:prstGeom>
           <a:ln w="76200">
             <a:solidFill>
-              <a:schemeClr val="tx1"/>
+              <a:schemeClr val="bg1">
+                <a:lumMod val="50000"/>
+              </a:schemeClr>
             </a:solidFill>
+            <a:prstDash val="sysDot"/>
             <a:headEnd w="lg" len="lg"/>
             <a:tailEnd type="arrow" w="lg" len="lg"/>
           </a:ln>
@@ -12237,8 +12228,11 @@
           </a:prstGeom>
           <a:ln w="76200">
             <a:solidFill>
-              <a:schemeClr val="tx1"/>
+              <a:schemeClr val="bg1">
+                <a:lumMod val="50000"/>
+              </a:schemeClr>
             </a:solidFill>
+            <a:prstDash val="sysDot"/>
             <a:headEnd w="lg" len="lg"/>
             <a:tailEnd type="arrow" w="lg" len="lg"/>
           </a:ln>
@@ -12276,8 +12270,11 @@
           </a:prstGeom>
           <a:ln w="76200">
             <a:solidFill>
-              <a:schemeClr val="tx1"/>
+              <a:schemeClr val="bg1">
+                <a:lumMod val="50000"/>
+              </a:schemeClr>
             </a:solidFill>
+            <a:prstDash val="sysDot"/>
             <a:headEnd w="lg" len="lg"/>
             <a:tailEnd type="arrow" w="lg" len="lg"/>
           </a:ln>
@@ -12442,8 +12439,11 @@
           </a:prstGeom>
           <a:ln w="76200">
             <a:solidFill>
-              <a:schemeClr val="tx1"/>
+              <a:schemeClr val="bg1">
+                <a:lumMod val="50000"/>
+              </a:schemeClr>
             </a:solidFill>
+            <a:prstDash val="sysDot"/>
             <a:headEnd w="lg" len="lg"/>
             <a:tailEnd type="arrow" w="lg" len="lg"/>
           </a:ln>
@@ -12575,8 +12575,11 @@
           </a:prstGeom>
           <a:ln w="76200">
             <a:solidFill>
-              <a:schemeClr val="tx1"/>
+              <a:schemeClr val="bg1">
+                <a:lumMod val="50000"/>
+              </a:schemeClr>
             </a:solidFill>
+            <a:prstDash val="sysDot"/>
             <a:headEnd w="lg" len="lg"/>
             <a:tailEnd type="arrow" w="lg" len="lg"/>
           </a:ln>
@@ -12615,8 +12618,11 @@
           </a:prstGeom>
           <a:ln w="76200">
             <a:solidFill>
-              <a:schemeClr val="tx1"/>
+              <a:schemeClr val="bg1">
+                <a:lumMod val="50000"/>
+              </a:schemeClr>
             </a:solidFill>
+            <a:prstDash val="sysDot"/>
             <a:headEnd w="lg" len="lg"/>
             <a:tailEnd type="arrow" w="lg" len="lg"/>
           </a:ln>
@@ -12652,8 +12658,11 @@
           </a:prstGeom>
           <a:ln w="76200">
             <a:solidFill>
-              <a:schemeClr val="tx1"/>
+              <a:schemeClr val="bg1">
+                <a:lumMod val="50000"/>
+              </a:schemeClr>
             </a:solidFill>
+            <a:prstDash val="sysDot"/>
             <a:headEnd w="lg" len="lg"/>
             <a:tailEnd type="arrow" w="lg" len="lg"/>
           </a:ln>
@@ -12841,8 +12850,11 @@
           </a:prstGeom>
           <a:ln w="76200">
             <a:solidFill>
-              <a:schemeClr val="tx1"/>
+              <a:schemeClr val="bg1">
+                <a:lumMod val="50000"/>
+              </a:schemeClr>
             </a:solidFill>
+            <a:prstDash val="sysDot"/>
             <a:headEnd w="lg" len="lg"/>
             <a:tailEnd type="arrow" w="lg" len="lg"/>
           </a:ln>
@@ -12880,8 +12892,11 @@
           </a:prstGeom>
           <a:ln w="76200">
             <a:solidFill>
-              <a:schemeClr val="tx1"/>
+              <a:schemeClr val="bg1">
+                <a:lumMod val="50000"/>
+              </a:schemeClr>
             </a:solidFill>
+            <a:prstDash val="sysDot"/>
             <a:headEnd w="lg" len="lg"/>
             <a:tailEnd type="arrow" w="lg" len="lg"/>
           </a:ln>
@@ -13046,8 +13061,11 @@
           </a:prstGeom>
           <a:ln w="76200">
             <a:solidFill>
-              <a:schemeClr val="tx1"/>
+              <a:schemeClr val="bg1">
+                <a:lumMod val="50000"/>
+              </a:schemeClr>
             </a:solidFill>
+            <a:prstDash val="sysDot"/>
             <a:headEnd w="lg" len="lg"/>
             <a:tailEnd type="arrow" w="lg" len="lg"/>
           </a:ln>
@@ -13083,8 +13101,11 @@
           </a:prstGeom>
           <a:ln w="76200">
             <a:solidFill>
-              <a:schemeClr val="tx1"/>
+              <a:schemeClr val="bg1">
+                <a:lumMod val="50000"/>
+              </a:schemeClr>
             </a:solidFill>
+            <a:prstDash val="sysDot"/>
             <a:headEnd w="lg" len="lg"/>
             <a:tailEnd type="arrow" w="lg" len="lg"/>
           </a:ln>
@@ -13216,8 +13237,11 @@
           </a:prstGeom>
           <a:ln w="76200">
             <a:solidFill>
-              <a:schemeClr val="tx1"/>
+              <a:schemeClr val="bg1">
+                <a:lumMod val="50000"/>
+              </a:schemeClr>
             </a:solidFill>
+            <a:prstDash val="sysDot"/>
             <a:headEnd w="lg" len="lg"/>
             <a:tailEnd type="arrow" w="lg" len="lg"/>
           </a:ln>
@@ -13256,8 +13280,11 @@
           </a:prstGeom>
           <a:ln w="76200">
             <a:solidFill>
-              <a:schemeClr val="tx1"/>
+              <a:schemeClr val="bg1">
+                <a:lumMod val="50000"/>
+              </a:schemeClr>
             </a:solidFill>
+            <a:prstDash val="sysDot"/>
             <a:headEnd w="lg" len="lg"/>
             <a:tailEnd type="arrow" w="lg" len="lg"/>
           </a:ln>
@@ -13511,8 +13538,11 @@
           </a:prstGeom>
           <a:ln w="76200">
             <a:solidFill>
-              <a:schemeClr val="tx1"/>
+              <a:schemeClr val="bg1">
+                <a:lumMod val="50000"/>
+              </a:schemeClr>
             </a:solidFill>
+            <a:prstDash val="sysDot"/>
             <a:headEnd w="lg" len="lg"/>
             <a:tailEnd type="arrow" w="lg" len="lg"/>
           </a:ln>
@@ -13551,8 +13581,11 @@
           </a:prstGeom>
           <a:ln w="76200">
             <a:solidFill>
-              <a:schemeClr val="tx1"/>
+              <a:schemeClr val="bg1">
+                <a:lumMod val="50000"/>
+              </a:schemeClr>
             </a:solidFill>
+            <a:prstDash val="sysDot"/>
             <a:headEnd w="lg" len="lg"/>
             <a:tailEnd type="arrow" w="lg" len="lg"/>
           </a:ln>
@@ -13628,8 +13661,11 @@
           </a:prstGeom>
           <a:ln w="76200">
             <a:solidFill>
-              <a:schemeClr val="tx1"/>
+              <a:schemeClr val="bg1">
+                <a:lumMod val="50000"/>
+              </a:schemeClr>
             </a:solidFill>
+            <a:prstDash val="sysDot"/>
             <a:headEnd w="lg" len="lg"/>
             <a:tailEnd type="arrow" w="lg" len="lg"/>
           </a:ln>
@@ -13717,8 +13753,11 @@
           </a:prstGeom>
           <a:ln w="76200">
             <a:solidFill>
-              <a:schemeClr val="tx1"/>
+              <a:schemeClr val="bg1">
+                <a:lumMod val="50000"/>
+              </a:schemeClr>
             </a:solidFill>
+            <a:prstDash val="sysDot"/>
             <a:headEnd w="lg" len="lg"/>
             <a:tailEnd type="arrow" w="lg" len="lg"/>
           </a:ln>
@@ -13957,8 +13996,11 @@
           </a:prstGeom>
           <a:ln w="76200">
             <a:solidFill>
-              <a:schemeClr val="tx1"/>
+              <a:schemeClr val="bg1">
+                <a:lumMod val="50000"/>
+              </a:schemeClr>
             </a:solidFill>
+            <a:prstDash val="sysDot"/>
             <a:headEnd w="lg" len="lg"/>
             <a:tailEnd type="arrow" w="lg" len="lg"/>
           </a:ln>
@@ -13996,8 +14038,11 @@
           </a:prstGeom>
           <a:ln w="76200">
             <a:solidFill>
-              <a:schemeClr val="tx1"/>
+              <a:schemeClr val="bg1">
+                <a:lumMod val="50000"/>
+              </a:schemeClr>
             </a:solidFill>
+            <a:prstDash val="sysDot"/>
             <a:headEnd w="lg" len="lg"/>
             <a:tailEnd type="arrow" w="lg" len="lg"/>
           </a:ln>
@@ -14081,8 +14126,11 @@
           </a:prstGeom>
           <a:ln w="76200">
             <a:solidFill>
-              <a:schemeClr val="tx1"/>
+              <a:schemeClr val="bg1">
+                <a:lumMod val="50000"/>
+              </a:schemeClr>
             </a:solidFill>
+            <a:prstDash val="sysDot"/>
             <a:headEnd w="lg" len="lg"/>
             <a:tailEnd type="arrow" w="lg" len="lg"/>
           </a:ln>
@@ -14300,8 +14348,11 @@
           </a:prstGeom>
           <a:ln w="76200">
             <a:solidFill>
-              <a:schemeClr val="tx1"/>
+              <a:schemeClr val="bg1">
+                <a:lumMod val="50000"/>
+              </a:schemeClr>
             </a:solidFill>
+            <a:prstDash val="sysDot"/>
             <a:headEnd w="lg" len="lg"/>
             <a:tailEnd type="arrow" w="lg" len="lg"/>
           </a:ln>
@@ -14601,8 +14652,11 @@
           </a:prstGeom>
           <a:ln w="76200">
             <a:solidFill>
-              <a:schemeClr val="tx1"/>
+              <a:schemeClr val="bg1">
+                <a:lumMod val="50000"/>
+              </a:schemeClr>
             </a:solidFill>
+            <a:prstDash val="sysDot"/>
             <a:headEnd w="lg" len="lg"/>
             <a:tailEnd type="arrow" w="lg" len="lg"/>
           </a:ln>
@@ -14952,6 +15006,7 @@
                 <a:lumMod val="50000"/>
               </a:schemeClr>
             </a:solidFill>
+            <a:prstDash val="sysDot"/>
             <a:headEnd w="lg" len="lg"/>
             <a:tailEnd type="arrow" w="lg" len="lg"/>
           </a:ln>
@@ -14993,6 +15048,7 @@
                 <a:lumMod val="50000"/>
               </a:schemeClr>
             </a:solidFill>
+            <a:prstDash val="sysDot"/>
             <a:headEnd w="lg" len="lg"/>
             <a:tailEnd type="arrow" w="lg" len="lg"/>
           </a:ln>
@@ -15030,11 +15086,11 @@
           </a:prstGeom>
           <a:ln w="76200">
             <a:solidFill>
-              <a:schemeClr val="accent6">
-                <a:lumMod val="60000"/>
-                <a:lumOff val="40000"/>
+              <a:schemeClr val="accent2">
+                <a:lumMod val="75000"/>
               </a:schemeClr>
             </a:solidFill>
+            <a:prstDash val="sysDot"/>
             <a:headEnd w="lg" len="lg"/>
             <a:tailEnd type="arrow" w="lg" len="lg"/>
           </a:ln>
@@ -15073,11 +15129,11 @@
           </a:prstGeom>
           <a:ln w="76200">
             <a:solidFill>
-              <a:schemeClr val="accent6">
-                <a:lumMod val="60000"/>
-                <a:lumOff val="40000"/>
+              <a:schemeClr val="accent2">
+                <a:lumMod val="75000"/>
               </a:schemeClr>
             </a:solidFill>
+            <a:prstDash val="sysDot"/>
             <a:headEnd w="lg" len="lg"/>
             <a:tailEnd type="arrow" w="lg" len="lg"/>
           </a:ln>
@@ -15161,8 +15217,11 @@
           </a:prstGeom>
           <a:ln w="76200">
             <a:solidFill>
-              <a:schemeClr val="tx1"/>
+              <a:schemeClr val="bg1">
+                <a:lumMod val="50000"/>
+              </a:schemeClr>
             </a:solidFill>
+            <a:prstDash val="sysDot"/>
             <a:headEnd w="lg" len="lg"/>
             <a:tailEnd type="arrow" w="lg" len="lg"/>
           </a:ln>
@@ -15462,8 +15521,11 @@
           </a:prstGeom>
           <a:ln w="76200">
             <a:solidFill>
-              <a:schemeClr val="tx1"/>
+              <a:schemeClr val="bg1">
+                <a:lumMod val="50000"/>
+              </a:schemeClr>
             </a:solidFill>
+            <a:prstDash val="sysDot"/>
             <a:headEnd w="lg" len="lg"/>
             <a:tailEnd type="arrow" w="lg" len="lg"/>
           </a:ln>
@@ -15727,6 +15789,7 @@
                 <a:lumMod val="50000"/>
               </a:schemeClr>
             </a:solidFill>
+            <a:prstDash val="sysDot"/>
             <a:headEnd w="lg" len="lg"/>
             <a:tailEnd type="arrow" w="lg" len="lg"/>
           </a:ln>
@@ -15768,6 +15831,7 @@
                 <a:lumMod val="50000"/>
               </a:schemeClr>
             </a:solidFill>
+            <a:prstDash val="sysDot"/>
             <a:headEnd w="lg" len="lg"/>
             <a:tailEnd type="arrow" w="lg" len="lg"/>
           </a:ln>
@@ -16333,8 +16397,11 @@
           </a:prstGeom>
           <a:ln w="76200">
             <a:solidFill>
-              <a:schemeClr val="tx1"/>
+              <a:schemeClr val="bg1">
+                <a:lumMod val="50000"/>
+              </a:schemeClr>
             </a:solidFill>
+            <a:prstDash val="sysDot"/>
             <a:headEnd w="lg" len="lg"/>
             <a:tailEnd type="arrow" w="lg" len="lg"/>
           </a:ln>
@@ -16634,8 +16701,11 @@
           </a:prstGeom>
           <a:ln w="76200">
             <a:solidFill>
-              <a:schemeClr val="tx1"/>
+              <a:schemeClr val="bg1">
+                <a:lumMod val="50000"/>
+              </a:schemeClr>
             </a:solidFill>
+            <a:prstDash val="sysDot"/>
             <a:headEnd w="lg" len="lg"/>
             <a:tailEnd type="arrow" w="lg" len="lg"/>
           </a:ln>
@@ -16895,11 +16965,11 @@
           </a:prstGeom>
           <a:ln w="76200">
             <a:solidFill>
-              <a:schemeClr val="accent6">
-                <a:lumMod val="60000"/>
-                <a:lumOff val="40000"/>
+              <a:schemeClr val="bg1">
+                <a:lumMod val="50000"/>
               </a:schemeClr>
             </a:solidFill>
+            <a:prstDash val="sysDot"/>
             <a:headEnd w="lg" len="lg"/>
             <a:tailEnd type="arrow" w="lg" len="lg"/>
           </a:ln>
@@ -16937,11 +17007,11 @@
           </a:prstGeom>
           <a:ln w="76200">
             <a:solidFill>
-              <a:schemeClr val="accent6">
-                <a:lumMod val="60000"/>
-                <a:lumOff val="40000"/>
+              <a:schemeClr val="bg1">
+                <a:lumMod val="50000"/>
               </a:schemeClr>
             </a:solidFill>
+            <a:prstDash val="sysDot"/>
             <a:headEnd w="lg" len="lg"/>
             <a:tailEnd type="arrow" w="lg" len="lg"/>
           </a:ln>
@@ -17256,8 +17326,11 @@
           </a:prstGeom>
           <a:ln w="76200">
             <a:solidFill>
-              <a:schemeClr val="tx1"/>
+              <a:schemeClr val="bg1">
+                <a:lumMod val="50000"/>
+              </a:schemeClr>
             </a:solidFill>
+            <a:prstDash val="sysDot"/>
             <a:headEnd w="lg" len="lg"/>
             <a:tailEnd type="arrow" w="lg" len="lg"/>
           </a:ln>
@@ -17296,8 +17369,11 @@
           </a:prstGeom>
           <a:ln w="76200">
             <a:solidFill>
-              <a:schemeClr val="tx1"/>
+              <a:schemeClr val="bg1">
+                <a:lumMod val="50000"/>
+              </a:schemeClr>
             </a:solidFill>
+            <a:prstDash val="sysDot"/>
             <a:headEnd w="lg" len="lg"/>
             <a:tailEnd type="arrow" w="lg" len="lg"/>
           </a:ln>
@@ -17336,8 +17412,11 @@
           </a:prstGeom>
           <a:ln w="76200">
             <a:solidFill>
-              <a:schemeClr val="tx1"/>
+              <a:schemeClr val="bg1">
+                <a:lumMod val="50000"/>
+              </a:schemeClr>
             </a:solidFill>
+            <a:prstDash val="sysDot"/>
             <a:headEnd w="lg" len="lg"/>
             <a:tailEnd type="arrow" w="lg" len="lg"/>
           </a:ln>
@@ -18876,8 +18955,11 @@
           </a:prstGeom>
           <a:ln w="76200">
             <a:solidFill>
-              <a:schemeClr val="tx1"/>
+              <a:schemeClr val="bg1">
+                <a:lumMod val="50000"/>
+              </a:schemeClr>
             </a:solidFill>
+            <a:prstDash val="sysDot"/>
             <a:headEnd w="lg" len="lg"/>
             <a:tailEnd type="arrow" w="lg" len="lg"/>
           </a:ln>
@@ -18916,8 +18998,11 @@
           </a:prstGeom>
           <a:ln w="76200">
             <a:solidFill>
-              <a:schemeClr val="tx1"/>
+              <a:schemeClr val="bg1">
+                <a:lumMod val="50000"/>
+              </a:schemeClr>
             </a:solidFill>
+            <a:prstDash val="sysDot"/>
             <a:headEnd w="lg" len="lg"/>
             <a:tailEnd type="arrow" w="lg" len="lg"/>
           </a:ln>
@@ -19071,8 +19156,11 @@
           </a:prstGeom>
           <a:ln w="76200">
             <a:solidFill>
-              <a:schemeClr val="tx1"/>
+              <a:schemeClr val="bg1">
+                <a:lumMod val="50000"/>
+              </a:schemeClr>
             </a:solidFill>
+            <a:prstDash val="sysDot"/>
             <a:headEnd w="lg" len="lg"/>
             <a:tailEnd type="arrow" w="lg" len="lg"/>
           </a:ln>
@@ -19111,8 +19199,11 @@
           </a:prstGeom>
           <a:ln w="76200">
             <a:solidFill>
-              <a:schemeClr val="tx1"/>
+              <a:schemeClr val="bg1">
+                <a:lumMod val="50000"/>
+              </a:schemeClr>
             </a:solidFill>
+            <a:prstDash val="sysDot"/>
             <a:headEnd w="lg" len="lg"/>
             <a:tailEnd type="arrow" w="lg" len="lg"/>
           </a:ln>

</xml_diff>

<commit_message>
Minor updates to Patterns presentations, major revision of MVVMStarter2018 dokumentation
Minor updates to Patterns presentations, major revision of
MVVMStarter2018 dokumentation
</commit_message>
<xml_diff>
--- a/CSharpProgramming/Presentations/OOProgPartIII/AbstractFactory.pptx
+++ b/CSharpProgramming/Presentations/OOProgPartIII/AbstractFactory.pptx
@@ -7,7 +7,7 @@
   <p:sldIdLst>
     <p:sldId id="271" r:id="rId2"/>
     <p:sldId id="458" r:id="rId3"/>
-    <p:sldId id="459" r:id="rId4"/>
+    <p:sldId id="466" r:id="rId4"/>
     <p:sldId id="402" r:id="rId5"/>
     <p:sldId id="436" r:id="rId6"/>
     <p:sldId id="437" r:id="rId7"/>
@@ -16002,7 +16002,7 @@
         </p:nvSpPr>
         <p:spPr>
           <a:xfrm>
-            <a:off x="5976910" y="4282195"/>
+            <a:off x="5976910" y="5013715"/>
             <a:ext cx="3347074" cy="918098"/>
           </a:xfrm>
           <a:prstGeom prst="roundRect">
@@ -16048,7 +16048,7 @@
         </p:nvSpPr>
         <p:spPr>
           <a:xfrm>
-            <a:off x="5976910" y="1336979"/>
+            <a:off x="5976910" y="605459"/>
             <a:ext cx="3347074" cy="918098"/>
           </a:xfrm>
           <a:prstGeom prst="roundRect">
@@ -16092,10 +16092,133 @@
           </a:p>
         </p:txBody>
       </p:sp>
+      <p:cxnSp>
+        <p:nvCxnSpPr>
+          <p:cNvPr id="6" name="Vinklet forbindelse 2"/>
+          <p:cNvCxnSpPr>
+            <a:stCxn id="10" idx="0"/>
+            <a:endCxn id="18" idx="2"/>
+          </p:cNvCxnSpPr>
+          <p:nvPr/>
+        </p:nvCxnSpPr>
+        <p:spPr>
+          <a:xfrm flipV="1">
+            <a:off x="7650447" y="1523557"/>
+            <a:ext cx="0" cy="1286030"/>
+          </a:xfrm>
+          <a:prstGeom prst="straightConnector1">
+            <a:avLst/>
+          </a:prstGeom>
+          <a:ln w="76200">
+            <a:solidFill>
+              <a:schemeClr val="tx1"/>
+            </a:solidFill>
+            <a:headEnd w="lg" len="lg"/>
+            <a:tailEnd type="triangle" w="lg" len="lg"/>
+          </a:ln>
+        </p:spPr>
+        <p:style>
+          <a:lnRef idx="1">
+            <a:schemeClr val="accent1"/>
+          </a:lnRef>
+          <a:fillRef idx="0">
+            <a:schemeClr val="accent1"/>
+          </a:fillRef>
+          <a:effectRef idx="0">
+            <a:schemeClr val="accent1"/>
+          </a:effectRef>
+          <a:fontRef idx="minor">
+            <a:schemeClr val="tx1"/>
+          </a:fontRef>
+        </p:style>
+      </p:cxnSp>
+      <p:cxnSp>
+        <p:nvCxnSpPr>
+          <p:cNvPr id="9" name="Vinklet forbindelse 2"/>
+          <p:cNvCxnSpPr>
+            <a:stCxn id="8" idx="0"/>
+            <a:endCxn id="10" idx="2"/>
+          </p:cNvCxnSpPr>
+          <p:nvPr/>
+        </p:nvCxnSpPr>
+        <p:spPr>
+          <a:xfrm flipV="1">
+            <a:off x="7650447" y="3727685"/>
+            <a:ext cx="0" cy="1286030"/>
+          </a:xfrm>
+          <a:prstGeom prst="straightConnector1">
+            <a:avLst/>
+          </a:prstGeom>
+          <a:ln w="76200">
+            <a:solidFill>
+              <a:schemeClr val="tx1"/>
+            </a:solidFill>
+            <a:headEnd w="lg" len="lg"/>
+            <a:tailEnd type="triangle" w="lg" len="lg"/>
+          </a:ln>
+        </p:spPr>
+        <p:style>
+          <a:lnRef idx="1">
+            <a:schemeClr val="accent1"/>
+          </a:lnRef>
+          <a:fillRef idx="0">
+            <a:schemeClr val="accent1"/>
+          </a:fillRef>
+          <a:effectRef idx="0">
+            <a:schemeClr val="accent1"/>
+          </a:effectRef>
+          <a:fontRef idx="minor">
+            <a:schemeClr val="tx1"/>
+          </a:fontRef>
+        </p:style>
+      </p:cxnSp>
+      <p:cxnSp>
+        <p:nvCxnSpPr>
+          <p:cNvPr id="13" name="Vinklet forbindelse 2"/>
+          <p:cNvCxnSpPr>
+            <a:stCxn id="4" idx="3"/>
+            <a:endCxn id="18" idx="1"/>
+          </p:cNvCxnSpPr>
+          <p:nvPr/>
+        </p:nvCxnSpPr>
+        <p:spPr>
+          <a:xfrm flipV="1">
+            <a:off x="3466857" y="1064508"/>
+            <a:ext cx="2510053" cy="2204128"/>
+          </a:xfrm>
+          <a:prstGeom prst="straightConnector1">
+            <a:avLst/>
+          </a:prstGeom>
+          <a:ln w="76200">
+            <a:solidFill>
+              <a:schemeClr val="bg1">
+                <a:lumMod val="50000"/>
+              </a:schemeClr>
+            </a:solidFill>
+            <a:prstDash val="sysDot"/>
+            <a:headEnd w="lg" len="lg"/>
+            <a:tailEnd type="arrow" w="lg" len="lg"/>
+          </a:ln>
+        </p:spPr>
+        <p:style>
+          <a:lnRef idx="1">
+            <a:schemeClr val="accent1"/>
+          </a:lnRef>
+          <a:fillRef idx="0">
+            <a:schemeClr val="accent1"/>
+          </a:fillRef>
+          <a:effectRef idx="0">
+            <a:schemeClr val="accent1"/>
+          </a:effectRef>
+          <a:fontRef idx="minor">
+            <a:schemeClr val="tx1"/>
+          </a:fontRef>
+        </p:style>
+      </p:cxnSp>
     </p:spTree>
     <p:extLst>
       <p:ext uri="{BB962C8B-B14F-4D97-AF65-F5344CB8AC3E}">
-        <p14:creationId xmlns:p14="http://schemas.microsoft.com/office/powerpoint/2010/main" val="3265135895"/>
+        <p14:creationId xmlns:p14="http://schemas.microsoft.com/office/powerpoint/2010/main" val="913141116"/>
       </p:ext>
     </p:extLst>
   </p:cSld>
@@ -16113,250 +16236,9 @@
   <p:timing>
     <p:tnLst>
       <p:par>
-        <p:cTn id="1" dur="indefinite" restart="never" nodeType="tmRoot">
-          <p:childTnLst>
-            <p:seq concurrent="1" nextAc="seek">
-              <p:cTn id="2" dur="indefinite" nodeType="mainSeq">
-                <p:childTnLst>
-                  <p:par>
-                    <p:cTn id="3" fill="hold">
-                      <p:stCondLst>
-                        <p:cond delay="indefinite"/>
-                      </p:stCondLst>
-                      <p:childTnLst>
-                        <p:par>
-                          <p:cTn id="4" fill="hold">
-                            <p:stCondLst>
-                              <p:cond delay="0"/>
-                            </p:stCondLst>
-                            <p:childTnLst>
-                              <p:par>
-                                <p:cTn id="5" presetID="10" presetClass="entr" presetSubtype="0" fill="hold" grpId="0" nodeType="clickEffect">
-                                  <p:stCondLst>
-                                    <p:cond delay="0"/>
-                                  </p:stCondLst>
-                                  <p:childTnLst>
-                                    <p:set>
-                                      <p:cBhvr>
-                                        <p:cTn id="6" dur="1" fill="hold">
-                                          <p:stCondLst>
-                                            <p:cond delay="0"/>
-                                          </p:stCondLst>
-                                        </p:cTn>
-                                        <p:tgtEl>
-                                          <p:spTgt spid="8"/>
-                                        </p:tgtEl>
-                                        <p:attrNameLst>
-                                          <p:attrName>style.visibility</p:attrName>
-                                        </p:attrNameLst>
-                                      </p:cBhvr>
-                                      <p:to>
-                                        <p:strVal val="visible"/>
-                                      </p:to>
-                                    </p:set>
-                                    <p:animEffect transition="in" filter="fade">
-                                      <p:cBhvr>
-                                        <p:cTn id="7" dur="500"/>
-                                        <p:tgtEl>
-                                          <p:spTgt spid="8"/>
-                                        </p:tgtEl>
-                                      </p:cBhvr>
-                                    </p:animEffect>
-                                  </p:childTnLst>
-                                </p:cTn>
-                              </p:par>
-                            </p:childTnLst>
-                          </p:cTn>
-                        </p:par>
-                      </p:childTnLst>
-                    </p:cTn>
-                  </p:par>
-                  <p:par>
-                    <p:cTn id="8" fill="hold">
-                      <p:stCondLst>
-                        <p:cond delay="indefinite"/>
-                      </p:stCondLst>
-                      <p:childTnLst>
-                        <p:par>
-                          <p:cTn id="9" fill="hold">
-                            <p:stCondLst>
-                              <p:cond delay="0"/>
-                            </p:stCondLst>
-                            <p:childTnLst>
-                              <p:par>
-                                <p:cTn id="10" presetID="10" presetClass="entr" presetSubtype="0" fill="hold" grpId="0" nodeType="clickEffect">
-                                  <p:stCondLst>
-                                    <p:cond delay="0"/>
-                                  </p:stCondLst>
-                                  <p:childTnLst>
-                                    <p:set>
-                                      <p:cBhvr>
-                                        <p:cTn id="11" dur="1" fill="hold">
-                                          <p:stCondLst>
-                                            <p:cond delay="0"/>
-                                          </p:stCondLst>
-                                        </p:cTn>
-                                        <p:tgtEl>
-                                          <p:spTgt spid="10"/>
-                                        </p:tgtEl>
-                                        <p:attrNameLst>
-                                          <p:attrName>style.visibility</p:attrName>
-                                        </p:attrNameLst>
-                                      </p:cBhvr>
-                                      <p:to>
-                                        <p:strVal val="visible"/>
-                                      </p:to>
-                                    </p:set>
-                                    <p:animEffect transition="in" filter="fade">
-                                      <p:cBhvr>
-                                        <p:cTn id="12" dur="500"/>
-                                        <p:tgtEl>
-                                          <p:spTgt spid="10"/>
-                                        </p:tgtEl>
-                                      </p:cBhvr>
-                                    </p:animEffect>
-                                  </p:childTnLst>
-                                </p:cTn>
-                              </p:par>
-                            </p:childTnLst>
-                          </p:cTn>
-                        </p:par>
-                      </p:childTnLst>
-                    </p:cTn>
-                  </p:par>
-                  <p:par>
-                    <p:cTn id="13" fill="hold">
-                      <p:stCondLst>
-                        <p:cond delay="indefinite"/>
-                      </p:stCondLst>
-                      <p:childTnLst>
-                        <p:par>
-                          <p:cTn id="14" fill="hold">
-                            <p:stCondLst>
-                              <p:cond delay="0"/>
-                            </p:stCondLst>
-                            <p:childTnLst>
-                              <p:par>
-                                <p:cTn id="15" presetID="10" presetClass="entr" presetSubtype="0" fill="hold" grpId="0" nodeType="clickEffect">
-                                  <p:stCondLst>
-                                    <p:cond delay="0"/>
-                                  </p:stCondLst>
-                                  <p:childTnLst>
-                                    <p:set>
-                                      <p:cBhvr>
-                                        <p:cTn id="16" dur="1" fill="hold">
-                                          <p:stCondLst>
-                                            <p:cond delay="0"/>
-                                          </p:stCondLst>
-                                        </p:cTn>
-                                        <p:tgtEl>
-                                          <p:spTgt spid="18"/>
-                                        </p:tgtEl>
-                                        <p:attrNameLst>
-                                          <p:attrName>style.visibility</p:attrName>
-                                        </p:attrNameLst>
-                                      </p:cBhvr>
-                                      <p:to>
-                                        <p:strVal val="visible"/>
-                                      </p:to>
-                                    </p:set>
-                                    <p:animEffect transition="in" filter="fade">
-                                      <p:cBhvr>
-                                        <p:cTn id="17" dur="500"/>
-                                        <p:tgtEl>
-                                          <p:spTgt spid="18"/>
-                                        </p:tgtEl>
-                                      </p:cBhvr>
-                                    </p:animEffect>
-                                  </p:childTnLst>
-                                </p:cTn>
-                              </p:par>
-                            </p:childTnLst>
-                          </p:cTn>
-                        </p:par>
-                      </p:childTnLst>
-                    </p:cTn>
-                  </p:par>
-                  <p:par>
-                    <p:cTn id="18" fill="hold">
-                      <p:stCondLst>
-                        <p:cond delay="indefinite"/>
-                      </p:stCondLst>
-                      <p:childTnLst>
-                        <p:par>
-                          <p:cTn id="19" fill="hold">
-                            <p:stCondLst>
-                              <p:cond delay="0"/>
-                            </p:stCondLst>
-                            <p:childTnLst>
-                              <p:par>
-                                <p:cTn id="20" presetID="10" presetClass="entr" presetSubtype="0" fill="hold" grpId="0" nodeType="clickEffect">
-                                  <p:stCondLst>
-                                    <p:cond delay="0"/>
-                                  </p:stCondLst>
-                                  <p:childTnLst>
-                                    <p:set>
-                                      <p:cBhvr>
-                                        <p:cTn id="21" dur="1" fill="hold">
-                                          <p:stCondLst>
-                                            <p:cond delay="0"/>
-                                          </p:stCondLst>
-                                        </p:cTn>
-                                        <p:tgtEl>
-                                          <p:spTgt spid="4"/>
-                                        </p:tgtEl>
-                                        <p:attrNameLst>
-                                          <p:attrName>style.visibility</p:attrName>
-                                        </p:attrNameLst>
-                                      </p:cBhvr>
-                                      <p:to>
-                                        <p:strVal val="visible"/>
-                                      </p:to>
-                                    </p:set>
-                                    <p:animEffect transition="in" filter="fade">
-                                      <p:cBhvr>
-                                        <p:cTn id="22" dur="500"/>
-                                        <p:tgtEl>
-                                          <p:spTgt spid="4"/>
-                                        </p:tgtEl>
-                                      </p:cBhvr>
-                                    </p:animEffect>
-                                  </p:childTnLst>
-                                </p:cTn>
-                              </p:par>
-                            </p:childTnLst>
-                          </p:cTn>
-                        </p:par>
-                      </p:childTnLst>
-                    </p:cTn>
-                  </p:par>
-                </p:childTnLst>
-              </p:cTn>
-              <p:prevCondLst>
-                <p:cond evt="onPrev" delay="0">
-                  <p:tgtEl>
-                    <p:sldTgt/>
-                  </p:tgtEl>
-                </p:cond>
-              </p:prevCondLst>
-              <p:nextCondLst>
-                <p:cond evt="onNext" delay="0">
-                  <p:tgtEl>
-                    <p:sldTgt/>
-                  </p:tgtEl>
-                </p:cond>
-              </p:nextCondLst>
-            </p:seq>
-          </p:childTnLst>
-        </p:cTn>
+        <p:cTn id="1" dur="indefinite" restart="never" nodeType="tmRoot"/>
       </p:par>
     </p:tnLst>
-    <p:bldLst>
-      <p:bldP spid="10" grpId="0" animBg="1"/>
-      <p:bldP spid="4" grpId="0" animBg="1"/>
-      <p:bldP spid="8" grpId="0" animBg="1"/>
-      <p:bldP spid="18" grpId="0" animBg="1"/>
-    </p:bldLst>
   </p:timing>
 </p:sld>
 </file>
@@ -16965,8 +16847,8 @@
           </a:prstGeom>
           <a:ln w="76200">
             <a:solidFill>
-              <a:schemeClr val="bg1">
-                <a:lumMod val="50000"/>
+              <a:schemeClr val="accent2">
+                <a:lumMod val="75000"/>
               </a:schemeClr>
             </a:solidFill>
             <a:prstDash val="sysDot"/>
@@ -17007,8 +16889,8 @@
           </a:prstGeom>
           <a:ln w="76200">
             <a:solidFill>
-              <a:schemeClr val="bg1">
-                <a:lumMod val="50000"/>
+              <a:schemeClr val="accent2">
+                <a:lumMod val="75000"/>
               </a:schemeClr>
             </a:solidFill>
             <a:prstDash val="sysDot"/>

</xml_diff>